<commit_message>
add MoCo - w/o distributed yet
</commit_message>
<xml_diff>
--- a/visualization/figures.pptx
+++ b/visualization/figures.pptx
@@ -105,15 +105,849 @@
       </a:defRPr>
     </a:lvl9pPr>
   </p:defaultTextStyle>
+  <p:extLst>
+    <p:ext uri="{EFAFB233-063F-42B5-8137-9DF3F51BA10A}">
+      <p15:sldGuideLst xmlns:p15="http://schemas.microsoft.com/office/powerpoint/2012/main"/>
+    </p:ext>
+  </p:extLst>
 </p:presentation>
 </file>
 
 <file path=ppt/revisionInfo.xml><?xml version="1.0" encoding="utf-8"?>
 <p1510:revInfo xmlns:a="http://schemas.openxmlformats.org/drawingml/2006/main" xmlns:r="http://schemas.openxmlformats.org/officeDocument/2006/relationships" xmlns:p1510="http://schemas.microsoft.com/office/powerpoint/2015/10/main">
   <p1510:revLst>
-    <p1510:client id="{6AFCFF47-415C-0F46-93A6-C1F844E9C1D0}" v="2" dt="2022-09-09T02:33:42.374"/>
+    <p1510:client id="{6AFCFF47-415C-0F46-93A6-C1F844E9C1D0}" v="38" dt="2022-09-11T04:10:53.288"/>
   </p1510:revLst>
 </p1510:revInfo>
+</file>
+
+<file path=ppt/changesInfos/changesInfo1.xml><?xml version="1.0" encoding="utf-8"?>
+<pc:chgInfo xmlns:a="http://schemas.openxmlformats.org/drawingml/2006/main" xmlns:r="http://schemas.openxmlformats.org/officeDocument/2006/relationships" xmlns:ac="http://schemas.microsoft.com/office/drawing/2013/main/command" xmlns:pc="http://schemas.microsoft.com/office/powerpoint/2013/main/command">
+  <pc:docChgLst>
+    <pc:chgData name="Bo Lin" userId="e1efd623-6904-4186-967c-a600b7b6bd49" providerId="ADAL" clId="{6AFCFF47-415C-0F46-93A6-C1F844E9C1D0}"/>
+    <pc:docChg chg="undo custSel modSld">
+      <pc:chgData name="Bo Lin" userId="e1efd623-6904-4186-967c-a600b7b6bd49" providerId="ADAL" clId="{6AFCFF47-415C-0F46-93A6-C1F844E9C1D0}" dt="2022-09-11T04:10:55.295" v="345" actId="1076"/>
+      <pc:docMkLst>
+        <pc:docMk/>
+      </pc:docMkLst>
+      <pc:sldChg chg="addSp delSp modSp mod">
+        <pc:chgData name="Bo Lin" userId="e1efd623-6904-4186-967c-a600b7b6bd49" providerId="ADAL" clId="{6AFCFF47-415C-0F46-93A6-C1F844E9C1D0}" dt="2022-09-11T04:10:55.295" v="345" actId="1076"/>
+        <pc:sldMkLst>
+          <pc:docMk/>
+          <pc:sldMk cId="3693280744" sldId="257"/>
+        </pc:sldMkLst>
+        <pc:spChg chg="add del mod topLvl">
+          <ac:chgData name="Bo Lin" userId="e1efd623-6904-4186-967c-a600b7b6bd49" providerId="ADAL" clId="{6AFCFF47-415C-0F46-93A6-C1F844E9C1D0}" dt="2022-09-11T03:33:02.145" v="148" actId="478"/>
+          <ac:spMkLst>
+            <pc:docMk/>
+            <pc:sldMk cId="3693280744" sldId="257"/>
+            <ac:spMk id="3" creationId="{FDC8A0A9-09FD-9F64-E446-EB72AF3669A1}"/>
+          </ac:spMkLst>
+        </pc:spChg>
+        <pc:spChg chg="del mod topLvl">
+          <ac:chgData name="Bo Lin" userId="e1efd623-6904-4186-967c-a600b7b6bd49" providerId="ADAL" clId="{6AFCFF47-415C-0F46-93A6-C1F844E9C1D0}" dt="2022-09-11T03:16:47.137" v="3" actId="478"/>
+          <ac:spMkLst>
+            <pc:docMk/>
+            <pc:sldMk cId="3693280744" sldId="257"/>
+            <ac:spMk id="6" creationId="{20CC8D76-61B5-0FAB-852F-21448E61558C}"/>
+          </ac:spMkLst>
+        </pc:spChg>
+        <pc:spChg chg="del mod topLvl">
+          <ac:chgData name="Bo Lin" userId="e1efd623-6904-4186-967c-a600b7b6bd49" providerId="ADAL" clId="{6AFCFF47-415C-0F46-93A6-C1F844E9C1D0}" dt="2022-09-11T03:16:45.038" v="2" actId="478"/>
+          <ac:spMkLst>
+            <pc:docMk/>
+            <pc:sldMk cId="3693280744" sldId="257"/>
+            <ac:spMk id="7" creationId="{39B7F6DE-451A-096E-524D-3EE3F6AE630C}"/>
+          </ac:spMkLst>
+        </pc:spChg>
+        <pc:spChg chg="del mod topLvl">
+          <ac:chgData name="Bo Lin" userId="e1efd623-6904-4186-967c-a600b7b6bd49" providerId="ADAL" clId="{6AFCFF47-415C-0F46-93A6-C1F844E9C1D0}" dt="2022-09-11T03:16:49.749" v="4" actId="478"/>
+          <ac:spMkLst>
+            <pc:docMk/>
+            <pc:sldMk cId="3693280744" sldId="257"/>
+            <ac:spMk id="10" creationId="{C903C718-F062-2913-265D-C93899E776F4}"/>
+          </ac:spMkLst>
+        </pc:spChg>
+        <pc:spChg chg="add del mod topLvl">
+          <ac:chgData name="Bo Lin" userId="e1efd623-6904-4186-967c-a600b7b6bd49" providerId="ADAL" clId="{6AFCFF47-415C-0F46-93A6-C1F844E9C1D0}" dt="2022-09-11T03:33:02.145" v="148" actId="478"/>
+          <ac:spMkLst>
+            <pc:docMk/>
+            <pc:sldMk cId="3693280744" sldId="257"/>
+            <ac:spMk id="11" creationId="{EB262663-8446-2943-ABA4-E5777B451042}"/>
+          </ac:spMkLst>
+        </pc:spChg>
+        <pc:spChg chg="add del mod topLvl">
+          <ac:chgData name="Bo Lin" userId="e1efd623-6904-4186-967c-a600b7b6bd49" providerId="ADAL" clId="{6AFCFF47-415C-0F46-93A6-C1F844E9C1D0}" dt="2022-09-11T03:33:02.145" v="148" actId="478"/>
+          <ac:spMkLst>
+            <pc:docMk/>
+            <pc:sldMk cId="3693280744" sldId="257"/>
+            <ac:spMk id="12" creationId="{2DFE8C0C-3831-5951-C11D-FB6899BD7204}"/>
+          </ac:spMkLst>
+        </pc:spChg>
+        <pc:spChg chg="del mod topLvl">
+          <ac:chgData name="Bo Lin" userId="e1efd623-6904-4186-967c-a600b7b6bd49" providerId="ADAL" clId="{6AFCFF47-415C-0F46-93A6-C1F844E9C1D0}" dt="2022-09-11T03:16:49.749" v="4" actId="478"/>
+          <ac:spMkLst>
+            <pc:docMk/>
+            <pc:sldMk cId="3693280744" sldId="257"/>
+            <ac:spMk id="19" creationId="{2E1F01DC-E5C6-259D-B6D7-ADD34A1A59BD}"/>
+          </ac:spMkLst>
+        </pc:spChg>
+        <pc:spChg chg="del mod topLvl">
+          <ac:chgData name="Bo Lin" userId="e1efd623-6904-4186-967c-a600b7b6bd49" providerId="ADAL" clId="{6AFCFF47-415C-0F46-93A6-C1F844E9C1D0}" dt="2022-09-11T03:16:49.749" v="4" actId="478"/>
+          <ac:spMkLst>
+            <pc:docMk/>
+            <pc:sldMk cId="3693280744" sldId="257"/>
+            <ac:spMk id="20" creationId="{DE93023B-DAD1-9A84-799C-C710964B4A5A}"/>
+          </ac:spMkLst>
+        </pc:spChg>
+        <pc:spChg chg="add del mod topLvl">
+          <ac:chgData name="Bo Lin" userId="e1efd623-6904-4186-967c-a600b7b6bd49" providerId="ADAL" clId="{6AFCFF47-415C-0F46-93A6-C1F844E9C1D0}" dt="2022-09-11T03:33:02.145" v="148" actId="478"/>
+          <ac:spMkLst>
+            <pc:docMk/>
+            <pc:sldMk cId="3693280744" sldId="257"/>
+            <ac:spMk id="21" creationId="{038940D6-6154-0C69-C075-AD24032AE03F}"/>
+          </ac:spMkLst>
+        </pc:spChg>
+        <pc:spChg chg="add del mod topLvl">
+          <ac:chgData name="Bo Lin" userId="e1efd623-6904-4186-967c-a600b7b6bd49" providerId="ADAL" clId="{6AFCFF47-415C-0F46-93A6-C1F844E9C1D0}" dt="2022-09-11T03:33:02.145" v="148" actId="478"/>
+          <ac:spMkLst>
+            <pc:docMk/>
+            <pc:sldMk cId="3693280744" sldId="257"/>
+            <ac:spMk id="23" creationId="{BD101154-DA38-C99E-17B9-9DA2C9AF720A}"/>
+          </ac:spMkLst>
+        </pc:spChg>
+        <pc:spChg chg="mod">
+          <ac:chgData name="Bo Lin" userId="e1efd623-6904-4186-967c-a600b7b6bd49" providerId="ADAL" clId="{6AFCFF47-415C-0F46-93A6-C1F844E9C1D0}" dt="2022-09-11T03:16:41.240" v="1" actId="165"/>
+          <ac:spMkLst>
+            <pc:docMk/>
+            <pc:sldMk cId="3693280744" sldId="257"/>
+            <ac:spMk id="25" creationId="{B14A3FE0-5FA2-6884-551C-6F4AF5C148BB}"/>
+          </ac:spMkLst>
+        </pc:spChg>
+        <pc:spChg chg="mod">
+          <ac:chgData name="Bo Lin" userId="e1efd623-6904-4186-967c-a600b7b6bd49" providerId="ADAL" clId="{6AFCFF47-415C-0F46-93A6-C1F844E9C1D0}" dt="2022-09-11T03:16:41.240" v="1" actId="165"/>
+          <ac:spMkLst>
+            <pc:docMk/>
+            <pc:sldMk cId="3693280744" sldId="257"/>
+            <ac:spMk id="26" creationId="{F5AE56A3-13A4-5D6B-7434-860D61967950}"/>
+          </ac:spMkLst>
+        </pc:spChg>
+        <pc:spChg chg="mod">
+          <ac:chgData name="Bo Lin" userId="e1efd623-6904-4186-967c-a600b7b6bd49" providerId="ADAL" clId="{6AFCFF47-415C-0F46-93A6-C1F844E9C1D0}" dt="2022-09-11T03:16:41.240" v="1" actId="165"/>
+          <ac:spMkLst>
+            <pc:docMk/>
+            <pc:sldMk cId="3693280744" sldId="257"/>
+            <ac:spMk id="27" creationId="{E5C7B434-946D-BDEC-677C-67B36985CBC5}"/>
+          </ac:spMkLst>
+        </pc:spChg>
+        <pc:spChg chg="mod">
+          <ac:chgData name="Bo Lin" userId="e1efd623-6904-4186-967c-a600b7b6bd49" providerId="ADAL" clId="{6AFCFF47-415C-0F46-93A6-C1F844E9C1D0}" dt="2022-09-11T03:16:41.240" v="1" actId="165"/>
+          <ac:spMkLst>
+            <pc:docMk/>
+            <pc:sldMk cId="3693280744" sldId="257"/>
+            <ac:spMk id="28" creationId="{F138EBE1-5C56-596B-1325-37334CA2EA5A}"/>
+          </ac:spMkLst>
+        </pc:spChg>
+        <pc:spChg chg="mod">
+          <ac:chgData name="Bo Lin" userId="e1efd623-6904-4186-967c-a600b7b6bd49" providerId="ADAL" clId="{6AFCFF47-415C-0F46-93A6-C1F844E9C1D0}" dt="2022-09-11T03:16:41.240" v="1" actId="165"/>
+          <ac:spMkLst>
+            <pc:docMk/>
+            <pc:sldMk cId="3693280744" sldId="257"/>
+            <ac:spMk id="29" creationId="{FE046C6F-3F72-2BF9-C7D7-38A176FD6432}"/>
+          </ac:spMkLst>
+        </pc:spChg>
+        <pc:spChg chg="mod">
+          <ac:chgData name="Bo Lin" userId="e1efd623-6904-4186-967c-a600b7b6bd49" providerId="ADAL" clId="{6AFCFF47-415C-0F46-93A6-C1F844E9C1D0}" dt="2022-09-11T03:16:41.240" v="1" actId="165"/>
+          <ac:spMkLst>
+            <pc:docMk/>
+            <pc:sldMk cId="3693280744" sldId="257"/>
+            <ac:spMk id="30" creationId="{F8FF69E8-D73C-E28F-138F-780D9F5303D2}"/>
+          </ac:spMkLst>
+        </pc:spChg>
+        <pc:spChg chg="mod">
+          <ac:chgData name="Bo Lin" userId="e1efd623-6904-4186-967c-a600b7b6bd49" providerId="ADAL" clId="{6AFCFF47-415C-0F46-93A6-C1F844E9C1D0}" dt="2022-09-11T03:16:41.240" v="1" actId="165"/>
+          <ac:spMkLst>
+            <pc:docMk/>
+            <pc:sldMk cId="3693280744" sldId="257"/>
+            <ac:spMk id="31" creationId="{5F81B29F-A4BD-19C5-E7B7-C3AAD3E12FF6}"/>
+          </ac:spMkLst>
+        </pc:spChg>
+        <pc:spChg chg="mod">
+          <ac:chgData name="Bo Lin" userId="e1efd623-6904-4186-967c-a600b7b6bd49" providerId="ADAL" clId="{6AFCFF47-415C-0F46-93A6-C1F844E9C1D0}" dt="2022-09-11T03:16:41.240" v="1" actId="165"/>
+          <ac:spMkLst>
+            <pc:docMk/>
+            <pc:sldMk cId="3693280744" sldId="257"/>
+            <ac:spMk id="32" creationId="{D1651CEC-949D-C3E5-B465-4195BC381865}"/>
+          </ac:spMkLst>
+        </pc:spChg>
+        <pc:spChg chg="mod">
+          <ac:chgData name="Bo Lin" userId="e1efd623-6904-4186-967c-a600b7b6bd49" providerId="ADAL" clId="{6AFCFF47-415C-0F46-93A6-C1F844E9C1D0}" dt="2022-09-11T03:16:41.240" v="1" actId="165"/>
+          <ac:spMkLst>
+            <pc:docMk/>
+            <pc:sldMk cId="3693280744" sldId="257"/>
+            <ac:spMk id="33" creationId="{B91C90B4-E467-D7B2-F4A5-B19950ADC154}"/>
+          </ac:spMkLst>
+        </pc:spChg>
+        <pc:spChg chg="mod">
+          <ac:chgData name="Bo Lin" userId="e1efd623-6904-4186-967c-a600b7b6bd49" providerId="ADAL" clId="{6AFCFF47-415C-0F46-93A6-C1F844E9C1D0}" dt="2022-09-11T03:16:41.240" v="1" actId="165"/>
+          <ac:spMkLst>
+            <pc:docMk/>
+            <pc:sldMk cId="3693280744" sldId="257"/>
+            <ac:spMk id="34" creationId="{21FC2D0F-0F11-2A59-21C9-B7A016212227}"/>
+          </ac:spMkLst>
+        </pc:spChg>
+        <pc:spChg chg="mod">
+          <ac:chgData name="Bo Lin" userId="e1efd623-6904-4186-967c-a600b7b6bd49" providerId="ADAL" clId="{6AFCFF47-415C-0F46-93A6-C1F844E9C1D0}" dt="2022-09-11T03:16:41.240" v="1" actId="165"/>
+          <ac:spMkLst>
+            <pc:docMk/>
+            <pc:sldMk cId="3693280744" sldId="257"/>
+            <ac:spMk id="35" creationId="{0383800D-3AFE-F916-A441-79A647678FE0}"/>
+          </ac:spMkLst>
+        </pc:spChg>
+        <pc:spChg chg="mod">
+          <ac:chgData name="Bo Lin" userId="e1efd623-6904-4186-967c-a600b7b6bd49" providerId="ADAL" clId="{6AFCFF47-415C-0F46-93A6-C1F844E9C1D0}" dt="2022-09-11T03:16:41.240" v="1" actId="165"/>
+          <ac:spMkLst>
+            <pc:docMk/>
+            <pc:sldMk cId="3693280744" sldId="257"/>
+            <ac:spMk id="36" creationId="{1461F5C1-D1C1-0258-D1F5-401D4A7BA22F}"/>
+          </ac:spMkLst>
+        </pc:spChg>
+        <pc:spChg chg="mod">
+          <ac:chgData name="Bo Lin" userId="e1efd623-6904-4186-967c-a600b7b6bd49" providerId="ADAL" clId="{6AFCFF47-415C-0F46-93A6-C1F844E9C1D0}" dt="2022-09-11T03:16:41.240" v="1" actId="165"/>
+          <ac:spMkLst>
+            <pc:docMk/>
+            <pc:sldMk cId="3693280744" sldId="257"/>
+            <ac:spMk id="37" creationId="{D47BD24F-AC5B-E89A-8332-99D75E46016A}"/>
+          </ac:spMkLst>
+        </pc:spChg>
+        <pc:spChg chg="mod">
+          <ac:chgData name="Bo Lin" userId="e1efd623-6904-4186-967c-a600b7b6bd49" providerId="ADAL" clId="{6AFCFF47-415C-0F46-93A6-C1F844E9C1D0}" dt="2022-09-11T03:16:41.240" v="1" actId="165"/>
+          <ac:spMkLst>
+            <pc:docMk/>
+            <pc:sldMk cId="3693280744" sldId="257"/>
+            <ac:spMk id="38" creationId="{F5B34EEE-8C21-CB74-BB92-FCE31A628724}"/>
+          </ac:spMkLst>
+        </pc:spChg>
+        <pc:spChg chg="mod">
+          <ac:chgData name="Bo Lin" userId="e1efd623-6904-4186-967c-a600b7b6bd49" providerId="ADAL" clId="{6AFCFF47-415C-0F46-93A6-C1F844E9C1D0}" dt="2022-09-11T03:16:41.240" v="1" actId="165"/>
+          <ac:spMkLst>
+            <pc:docMk/>
+            <pc:sldMk cId="3693280744" sldId="257"/>
+            <ac:spMk id="39" creationId="{3BAFDFBE-6AE9-E950-B1CA-B2881ED567AB}"/>
+          </ac:spMkLst>
+        </pc:spChg>
+        <pc:spChg chg="add mod">
+          <ac:chgData name="Bo Lin" userId="e1efd623-6904-4186-967c-a600b7b6bd49" providerId="ADAL" clId="{6AFCFF47-415C-0F46-93A6-C1F844E9C1D0}" dt="2022-09-11T03:27:57.349" v="125" actId="164"/>
+          <ac:spMkLst>
+            <pc:docMk/>
+            <pc:sldMk cId="3693280744" sldId="257"/>
+            <ac:spMk id="40" creationId="{153127A0-21BC-1BD9-207A-E08FBC8C0EDB}"/>
+          </ac:spMkLst>
+        </pc:spChg>
+        <pc:spChg chg="mod">
+          <ac:chgData name="Bo Lin" userId="e1efd623-6904-4186-967c-a600b7b6bd49" providerId="ADAL" clId="{6AFCFF47-415C-0F46-93A6-C1F844E9C1D0}" dt="2022-09-11T03:27:40.804" v="122" actId="164"/>
+          <ac:spMkLst>
+            <pc:docMk/>
+            <pc:sldMk cId="3693280744" sldId="257"/>
+            <ac:spMk id="53" creationId="{3C488E65-5267-D0D3-20FD-55B7565056E6}"/>
+          </ac:spMkLst>
+        </pc:spChg>
+        <pc:spChg chg="mod">
+          <ac:chgData name="Bo Lin" userId="e1efd623-6904-4186-967c-a600b7b6bd49" providerId="ADAL" clId="{6AFCFF47-415C-0F46-93A6-C1F844E9C1D0}" dt="2022-09-11T03:27:40.804" v="122" actId="164"/>
+          <ac:spMkLst>
+            <pc:docMk/>
+            <pc:sldMk cId="3693280744" sldId="257"/>
+            <ac:spMk id="54" creationId="{A8BAE91B-BA5C-4383-87DF-3C96C8405EC5}"/>
+          </ac:spMkLst>
+        </pc:spChg>
+        <pc:spChg chg="mod">
+          <ac:chgData name="Bo Lin" userId="e1efd623-6904-4186-967c-a600b7b6bd49" providerId="ADAL" clId="{6AFCFF47-415C-0F46-93A6-C1F844E9C1D0}" dt="2022-09-11T03:27:40.804" v="122" actId="164"/>
+          <ac:spMkLst>
+            <pc:docMk/>
+            <pc:sldMk cId="3693280744" sldId="257"/>
+            <ac:spMk id="55" creationId="{32F936B3-4E3C-19B8-A18D-C0688CEF0230}"/>
+          </ac:spMkLst>
+        </pc:spChg>
+        <pc:spChg chg="mod">
+          <ac:chgData name="Bo Lin" userId="e1efd623-6904-4186-967c-a600b7b6bd49" providerId="ADAL" clId="{6AFCFF47-415C-0F46-93A6-C1F844E9C1D0}" dt="2022-09-11T03:27:40.804" v="122" actId="164"/>
+          <ac:spMkLst>
+            <pc:docMk/>
+            <pc:sldMk cId="3693280744" sldId="257"/>
+            <ac:spMk id="56" creationId="{9EEB7175-AA14-D50E-6DD1-809B1B4DFA6B}"/>
+          </ac:spMkLst>
+        </pc:spChg>
+        <pc:spChg chg="mod">
+          <ac:chgData name="Bo Lin" userId="e1efd623-6904-4186-967c-a600b7b6bd49" providerId="ADAL" clId="{6AFCFF47-415C-0F46-93A6-C1F844E9C1D0}" dt="2022-09-11T03:27:40.804" v="122" actId="164"/>
+          <ac:spMkLst>
+            <pc:docMk/>
+            <pc:sldMk cId="3693280744" sldId="257"/>
+            <ac:spMk id="57" creationId="{4F9475ED-F410-F420-4925-0D26C680B052}"/>
+          </ac:spMkLst>
+        </pc:spChg>
+        <pc:spChg chg="mod">
+          <ac:chgData name="Bo Lin" userId="e1efd623-6904-4186-967c-a600b7b6bd49" providerId="ADAL" clId="{6AFCFF47-415C-0F46-93A6-C1F844E9C1D0}" dt="2022-09-11T03:27:40.804" v="122" actId="164"/>
+          <ac:spMkLst>
+            <pc:docMk/>
+            <pc:sldMk cId="3693280744" sldId="257"/>
+            <ac:spMk id="59" creationId="{951D50D7-FDE5-C8A2-EC41-6A402109BB76}"/>
+          </ac:spMkLst>
+        </pc:spChg>
+        <pc:spChg chg="mod">
+          <ac:chgData name="Bo Lin" userId="e1efd623-6904-4186-967c-a600b7b6bd49" providerId="ADAL" clId="{6AFCFF47-415C-0F46-93A6-C1F844E9C1D0}" dt="2022-09-11T03:27:40.804" v="122" actId="164"/>
+          <ac:spMkLst>
+            <pc:docMk/>
+            <pc:sldMk cId="3693280744" sldId="257"/>
+            <ac:spMk id="60" creationId="{F9F8B00F-D346-34A7-CE31-637BC7714A36}"/>
+          </ac:spMkLst>
+        </pc:spChg>
+        <pc:spChg chg="mod">
+          <ac:chgData name="Bo Lin" userId="e1efd623-6904-4186-967c-a600b7b6bd49" providerId="ADAL" clId="{6AFCFF47-415C-0F46-93A6-C1F844E9C1D0}" dt="2022-09-11T03:27:40.804" v="122" actId="164"/>
+          <ac:spMkLst>
+            <pc:docMk/>
+            <pc:sldMk cId="3693280744" sldId="257"/>
+            <ac:spMk id="61" creationId="{595B1413-1D67-66E4-7916-BCFE74D79A04}"/>
+          </ac:spMkLst>
+        </pc:spChg>
+        <pc:spChg chg="mod">
+          <ac:chgData name="Bo Lin" userId="e1efd623-6904-4186-967c-a600b7b6bd49" providerId="ADAL" clId="{6AFCFF47-415C-0F46-93A6-C1F844E9C1D0}" dt="2022-09-11T03:27:40.804" v="122" actId="164"/>
+          <ac:spMkLst>
+            <pc:docMk/>
+            <pc:sldMk cId="3693280744" sldId="257"/>
+            <ac:spMk id="62" creationId="{6DD40FD7-A537-5BC1-FDB9-5676A34B00DC}"/>
+          </ac:spMkLst>
+        </pc:spChg>
+        <pc:spChg chg="mod">
+          <ac:chgData name="Bo Lin" userId="e1efd623-6904-4186-967c-a600b7b6bd49" providerId="ADAL" clId="{6AFCFF47-415C-0F46-93A6-C1F844E9C1D0}" dt="2022-09-11T03:27:40.804" v="122" actId="164"/>
+          <ac:spMkLst>
+            <pc:docMk/>
+            <pc:sldMk cId="3693280744" sldId="257"/>
+            <ac:spMk id="63" creationId="{E319B628-D062-2BEF-9923-D5BE2458097A}"/>
+          </ac:spMkLst>
+        </pc:spChg>
+        <pc:spChg chg="add mod">
+          <ac:chgData name="Bo Lin" userId="e1efd623-6904-4186-967c-a600b7b6bd49" providerId="ADAL" clId="{6AFCFF47-415C-0F46-93A6-C1F844E9C1D0}" dt="2022-09-11T03:27:57.349" v="125" actId="164"/>
+          <ac:spMkLst>
+            <pc:docMk/>
+            <pc:sldMk cId="3693280744" sldId="257"/>
+            <ac:spMk id="70" creationId="{03663897-050F-1EE4-44A6-E3430995520D}"/>
+          </ac:spMkLst>
+        </pc:spChg>
+        <pc:spChg chg="add mod topLvl">
+          <ac:chgData name="Bo Lin" userId="e1efd623-6904-4186-967c-a600b7b6bd49" providerId="ADAL" clId="{6AFCFF47-415C-0F46-93A6-C1F844E9C1D0}" dt="2022-09-11T04:05:43.098" v="282" actId="164"/>
+          <ac:spMkLst>
+            <pc:docMk/>
+            <pc:sldMk cId="3693280744" sldId="257"/>
+            <ac:spMk id="82" creationId="{54F814BE-30E7-A76E-D747-C3C8A3F6093C}"/>
+          </ac:spMkLst>
+        </pc:spChg>
+        <pc:spChg chg="mod">
+          <ac:chgData name="Bo Lin" userId="e1efd623-6904-4186-967c-a600b7b6bd49" providerId="ADAL" clId="{6AFCFF47-415C-0F46-93A6-C1F844E9C1D0}" dt="2022-09-11T03:30:07.015" v="129"/>
+          <ac:spMkLst>
+            <pc:docMk/>
+            <pc:sldMk cId="3693280744" sldId="257"/>
+            <ac:spMk id="84" creationId="{90EB7F80-727E-C695-161C-189A82F815FA}"/>
+          </ac:spMkLst>
+        </pc:spChg>
+        <pc:spChg chg="mod">
+          <ac:chgData name="Bo Lin" userId="e1efd623-6904-4186-967c-a600b7b6bd49" providerId="ADAL" clId="{6AFCFF47-415C-0F46-93A6-C1F844E9C1D0}" dt="2022-09-11T03:30:07.015" v="129"/>
+          <ac:spMkLst>
+            <pc:docMk/>
+            <pc:sldMk cId="3693280744" sldId="257"/>
+            <ac:spMk id="85" creationId="{17050B3A-B51C-57A0-BCA3-EEA0699324C9}"/>
+          </ac:spMkLst>
+        </pc:spChg>
+        <pc:spChg chg="mod">
+          <ac:chgData name="Bo Lin" userId="e1efd623-6904-4186-967c-a600b7b6bd49" providerId="ADAL" clId="{6AFCFF47-415C-0F46-93A6-C1F844E9C1D0}" dt="2022-09-11T03:30:07.015" v="129"/>
+          <ac:spMkLst>
+            <pc:docMk/>
+            <pc:sldMk cId="3693280744" sldId="257"/>
+            <ac:spMk id="86" creationId="{A9A6B47B-6BF0-7456-A488-D49840F8D892}"/>
+          </ac:spMkLst>
+        </pc:spChg>
+        <pc:spChg chg="mod">
+          <ac:chgData name="Bo Lin" userId="e1efd623-6904-4186-967c-a600b7b6bd49" providerId="ADAL" clId="{6AFCFF47-415C-0F46-93A6-C1F844E9C1D0}" dt="2022-09-11T03:30:07.015" v="129"/>
+          <ac:spMkLst>
+            <pc:docMk/>
+            <pc:sldMk cId="3693280744" sldId="257"/>
+            <ac:spMk id="87" creationId="{3494222C-6A91-3229-A343-2DEA642A3173}"/>
+          </ac:spMkLst>
+        </pc:spChg>
+        <pc:spChg chg="mod">
+          <ac:chgData name="Bo Lin" userId="e1efd623-6904-4186-967c-a600b7b6bd49" providerId="ADAL" clId="{6AFCFF47-415C-0F46-93A6-C1F844E9C1D0}" dt="2022-09-11T03:30:07.015" v="129"/>
+          <ac:spMkLst>
+            <pc:docMk/>
+            <pc:sldMk cId="3693280744" sldId="257"/>
+            <ac:spMk id="88" creationId="{BF7E393E-B10E-7500-EE37-BEC8CCEF6973}"/>
+          </ac:spMkLst>
+        </pc:spChg>
+        <pc:spChg chg="add mod topLvl">
+          <ac:chgData name="Bo Lin" userId="e1efd623-6904-4186-967c-a600b7b6bd49" providerId="ADAL" clId="{6AFCFF47-415C-0F46-93A6-C1F844E9C1D0}" dt="2022-09-11T04:05:43.098" v="282" actId="164"/>
+          <ac:spMkLst>
+            <pc:docMk/>
+            <pc:sldMk cId="3693280744" sldId="257"/>
+            <ac:spMk id="89" creationId="{DDA2A239-98AE-E5AA-5B75-B7850B7D1DEA}"/>
+          </ac:spMkLst>
+        </pc:spChg>
+        <pc:spChg chg="mod">
+          <ac:chgData name="Bo Lin" userId="e1efd623-6904-4186-967c-a600b7b6bd49" providerId="ADAL" clId="{6AFCFF47-415C-0F46-93A6-C1F844E9C1D0}" dt="2022-09-11T03:33:26.990" v="151" actId="165"/>
+          <ac:spMkLst>
+            <pc:docMk/>
+            <pc:sldMk cId="3693280744" sldId="257"/>
+            <ac:spMk id="91" creationId="{70D950CB-13BC-54C2-700B-08BBADBC45D5}"/>
+          </ac:spMkLst>
+        </pc:spChg>
+        <pc:spChg chg="mod">
+          <ac:chgData name="Bo Lin" userId="e1efd623-6904-4186-967c-a600b7b6bd49" providerId="ADAL" clId="{6AFCFF47-415C-0F46-93A6-C1F844E9C1D0}" dt="2022-09-11T03:33:26.990" v="151" actId="165"/>
+          <ac:spMkLst>
+            <pc:docMk/>
+            <pc:sldMk cId="3693280744" sldId="257"/>
+            <ac:spMk id="92" creationId="{B436F055-8BD4-F141-61D2-BEEFFB789848}"/>
+          </ac:spMkLst>
+        </pc:spChg>
+        <pc:spChg chg="mod">
+          <ac:chgData name="Bo Lin" userId="e1efd623-6904-4186-967c-a600b7b6bd49" providerId="ADAL" clId="{6AFCFF47-415C-0F46-93A6-C1F844E9C1D0}" dt="2022-09-11T03:33:26.990" v="151" actId="165"/>
+          <ac:spMkLst>
+            <pc:docMk/>
+            <pc:sldMk cId="3693280744" sldId="257"/>
+            <ac:spMk id="93" creationId="{7914888B-ABF6-F4E7-2128-0028D7A636AD}"/>
+          </ac:spMkLst>
+        </pc:spChg>
+        <pc:spChg chg="mod">
+          <ac:chgData name="Bo Lin" userId="e1efd623-6904-4186-967c-a600b7b6bd49" providerId="ADAL" clId="{6AFCFF47-415C-0F46-93A6-C1F844E9C1D0}" dt="2022-09-11T03:33:26.990" v="151" actId="165"/>
+          <ac:spMkLst>
+            <pc:docMk/>
+            <pc:sldMk cId="3693280744" sldId="257"/>
+            <ac:spMk id="94" creationId="{0434E020-7D3F-4213-FF34-BD4D90E19DF0}"/>
+          </ac:spMkLst>
+        </pc:spChg>
+        <pc:spChg chg="mod">
+          <ac:chgData name="Bo Lin" userId="e1efd623-6904-4186-967c-a600b7b6bd49" providerId="ADAL" clId="{6AFCFF47-415C-0F46-93A6-C1F844E9C1D0}" dt="2022-09-11T03:33:26.990" v="151" actId="165"/>
+          <ac:spMkLst>
+            <pc:docMk/>
+            <pc:sldMk cId="3693280744" sldId="257"/>
+            <ac:spMk id="95" creationId="{6CEB0AFA-7456-096F-E493-8FFD070F2FA6}"/>
+          </ac:spMkLst>
+        </pc:spChg>
+        <pc:spChg chg="mod">
+          <ac:chgData name="Bo Lin" userId="e1efd623-6904-4186-967c-a600b7b6bd49" providerId="ADAL" clId="{6AFCFF47-415C-0F46-93A6-C1F844E9C1D0}" dt="2022-09-11T03:33:26.990" v="151" actId="165"/>
+          <ac:spMkLst>
+            <pc:docMk/>
+            <pc:sldMk cId="3693280744" sldId="257"/>
+            <ac:spMk id="98" creationId="{1CA6DC50-D0EB-1934-8F44-6F99F60F93A6}"/>
+          </ac:spMkLst>
+        </pc:spChg>
+        <pc:spChg chg="mod">
+          <ac:chgData name="Bo Lin" userId="e1efd623-6904-4186-967c-a600b7b6bd49" providerId="ADAL" clId="{6AFCFF47-415C-0F46-93A6-C1F844E9C1D0}" dt="2022-09-11T03:33:26.990" v="151" actId="165"/>
+          <ac:spMkLst>
+            <pc:docMk/>
+            <pc:sldMk cId="3693280744" sldId="257"/>
+            <ac:spMk id="99" creationId="{28A21995-38D2-C2E7-649D-3EAB3EA23A81}"/>
+          </ac:spMkLst>
+        </pc:spChg>
+        <pc:spChg chg="mod">
+          <ac:chgData name="Bo Lin" userId="e1efd623-6904-4186-967c-a600b7b6bd49" providerId="ADAL" clId="{6AFCFF47-415C-0F46-93A6-C1F844E9C1D0}" dt="2022-09-11T03:33:26.990" v="151" actId="165"/>
+          <ac:spMkLst>
+            <pc:docMk/>
+            <pc:sldMk cId="3693280744" sldId="257"/>
+            <ac:spMk id="100" creationId="{D7D91DD3-A8AC-A2CF-7E28-95935DD7FF9A}"/>
+          </ac:spMkLst>
+        </pc:spChg>
+        <pc:spChg chg="add mod topLvl">
+          <ac:chgData name="Bo Lin" userId="e1efd623-6904-4186-967c-a600b7b6bd49" providerId="ADAL" clId="{6AFCFF47-415C-0F46-93A6-C1F844E9C1D0}" dt="2022-09-11T04:05:43.098" v="282" actId="164"/>
+          <ac:spMkLst>
+            <pc:docMk/>
+            <pc:sldMk cId="3693280744" sldId="257"/>
+            <ac:spMk id="102" creationId="{5CB8AE13-02A6-AB38-9F3E-64D107C13A28}"/>
+          </ac:spMkLst>
+        </pc:spChg>
+        <pc:spChg chg="add mod topLvl">
+          <ac:chgData name="Bo Lin" userId="e1efd623-6904-4186-967c-a600b7b6bd49" providerId="ADAL" clId="{6AFCFF47-415C-0F46-93A6-C1F844E9C1D0}" dt="2022-09-11T04:05:43.098" v="282" actId="164"/>
+          <ac:spMkLst>
+            <pc:docMk/>
+            <pc:sldMk cId="3693280744" sldId="257"/>
+            <ac:spMk id="104" creationId="{978E42F7-8AD7-8BD1-8EE9-C7290AC018D2}"/>
+          </ac:spMkLst>
+        </pc:spChg>
+        <pc:spChg chg="add del mod">
+          <ac:chgData name="Bo Lin" userId="e1efd623-6904-4186-967c-a600b7b6bd49" providerId="ADAL" clId="{6AFCFF47-415C-0F46-93A6-C1F844E9C1D0}" dt="2022-09-11T03:34:55.573" v="171"/>
+          <ac:spMkLst>
+            <pc:docMk/>
+            <pc:sldMk cId="3693280744" sldId="257"/>
+            <ac:spMk id="123" creationId="{D24C27EA-1829-AE2A-3682-8DC9422C7F19}"/>
+          </ac:spMkLst>
+        </pc:spChg>
+        <pc:spChg chg="add mod">
+          <ac:chgData name="Bo Lin" userId="e1efd623-6904-4186-967c-a600b7b6bd49" providerId="ADAL" clId="{6AFCFF47-415C-0F46-93A6-C1F844E9C1D0}" dt="2022-09-11T04:05:43.098" v="282" actId="164"/>
+          <ac:spMkLst>
+            <pc:docMk/>
+            <pc:sldMk cId="3693280744" sldId="257"/>
+            <ac:spMk id="124" creationId="{FABA79D2-546B-F130-545C-F14F9F2981C2}"/>
+          </ac:spMkLst>
+        </pc:spChg>
+        <pc:spChg chg="add mod">
+          <ac:chgData name="Bo Lin" userId="e1efd623-6904-4186-967c-a600b7b6bd49" providerId="ADAL" clId="{6AFCFF47-415C-0F46-93A6-C1F844E9C1D0}" dt="2022-09-11T04:05:43.098" v="282" actId="164"/>
+          <ac:spMkLst>
+            <pc:docMk/>
+            <pc:sldMk cId="3693280744" sldId="257"/>
+            <ac:spMk id="125" creationId="{6E4EA7AD-5201-86A6-8C3F-0D8D88D89C38}"/>
+          </ac:spMkLst>
+        </pc:spChg>
+        <pc:spChg chg="add del mod">
+          <ac:chgData name="Bo Lin" userId="e1efd623-6904-4186-967c-a600b7b6bd49" providerId="ADAL" clId="{6AFCFF47-415C-0F46-93A6-C1F844E9C1D0}" dt="2022-09-11T04:05:00.331" v="236" actId="478"/>
+          <ac:spMkLst>
+            <pc:docMk/>
+            <pc:sldMk cId="3693280744" sldId="257"/>
+            <ac:spMk id="126" creationId="{B0158FD0-8AF9-F690-8AC3-E1FEA4C8CEAF}"/>
+          </ac:spMkLst>
+        </pc:spChg>
+        <pc:spChg chg="add mod">
+          <ac:chgData name="Bo Lin" userId="e1efd623-6904-4186-967c-a600b7b6bd49" providerId="ADAL" clId="{6AFCFF47-415C-0F46-93A6-C1F844E9C1D0}" dt="2022-09-11T04:05:43.098" v="282" actId="164"/>
+          <ac:spMkLst>
+            <pc:docMk/>
+            <pc:sldMk cId="3693280744" sldId="257"/>
+            <ac:spMk id="127" creationId="{90A40ED3-8764-C1A8-478D-3717F95DF2B1}"/>
+          </ac:spMkLst>
+        </pc:spChg>
+        <pc:spChg chg="add del mod">
+          <ac:chgData name="Bo Lin" userId="e1efd623-6904-4186-967c-a600b7b6bd49" providerId="ADAL" clId="{6AFCFF47-415C-0F46-93A6-C1F844E9C1D0}" dt="2022-09-11T04:05:37.995" v="281" actId="478"/>
+          <ac:spMkLst>
+            <pc:docMk/>
+            <pc:sldMk cId="3693280744" sldId="257"/>
+            <ac:spMk id="128" creationId="{4AF4E49B-51FF-CA7B-33CF-1E2183FA4038}"/>
+          </ac:spMkLst>
+        </pc:spChg>
+        <pc:spChg chg="add mod">
+          <ac:chgData name="Bo Lin" userId="e1efd623-6904-4186-967c-a600b7b6bd49" providerId="ADAL" clId="{6AFCFF47-415C-0F46-93A6-C1F844E9C1D0}" dt="2022-09-11T04:10:53.288" v="344" actId="164"/>
+          <ac:spMkLst>
+            <pc:docMk/>
+            <pc:sldMk cId="3693280744" sldId="257"/>
+            <ac:spMk id="132" creationId="{65CC9823-730F-DB29-1807-289758800B0E}"/>
+          </ac:spMkLst>
+        </pc:spChg>
+        <pc:spChg chg="add mod">
+          <ac:chgData name="Bo Lin" userId="e1efd623-6904-4186-967c-a600b7b6bd49" providerId="ADAL" clId="{6AFCFF47-415C-0F46-93A6-C1F844E9C1D0}" dt="2022-09-11T04:10:53.288" v="344" actId="164"/>
+          <ac:spMkLst>
+            <pc:docMk/>
+            <pc:sldMk cId="3693280744" sldId="257"/>
+            <ac:spMk id="133" creationId="{5689DD33-2013-B485-091F-4CAF0F972394}"/>
+          </ac:spMkLst>
+        </pc:spChg>
+        <pc:grpChg chg="add del mod">
+          <ac:chgData name="Bo Lin" userId="e1efd623-6904-4186-967c-a600b7b6bd49" providerId="ADAL" clId="{6AFCFF47-415C-0F46-93A6-C1F844E9C1D0}" dt="2022-09-11T03:16:41.240" v="1" actId="165"/>
+          <ac:grpSpMkLst>
+            <pc:docMk/>
+            <pc:sldMk cId="3693280744" sldId="257"/>
+            <ac:grpSpMk id="2" creationId="{2E2A96E9-EA31-EE75-9E4A-A9573B0C4D02}"/>
+          </ac:grpSpMkLst>
+        </pc:grpChg>
+        <pc:grpChg chg="add del mod topLvl">
+          <ac:chgData name="Bo Lin" userId="e1efd623-6904-4186-967c-a600b7b6bd49" providerId="ADAL" clId="{6AFCFF47-415C-0F46-93A6-C1F844E9C1D0}" dt="2022-09-11T03:33:02.145" v="148" actId="478"/>
+          <ac:grpSpMkLst>
+            <pc:docMk/>
+            <pc:sldMk cId="3693280744" sldId="257"/>
+            <ac:grpSpMk id="8" creationId="{DAE30314-F45E-585E-AC88-045A5A2C114A}"/>
+          </ac:grpSpMkLst>
+        </pc:grpChg>
+        <pc:grpChg chg="add del mod topLvl">
+          <ac:chgData name="Bo Lin" userId="e1efd623-6904-4186-967c-a600b7b6bd49" providerId="ADAL" clId="{6AFCFF47-415C-0F46-93A6-C1F844E9C1D0}" dt="2022-09-11T03:33:02.145" v="148" actId="478"/>
+          <ac:grpSpMkLst>
+            <pc:docMk/>
+            <pc:sldMk cId="3693280744" sldId="257"/>
+            <ac:grpSpMk id="13" creationId="{47A4FCEA-7282-042E-E3C8-4EA567960A7F}"/>
+          </ac:grpSpMkLst>
+        </pc:grpChg>
+        <pc:grpChg chg="add del mod topLvl">
+          <ac:chgData name="Bo Lin" userId="e1efd623-6904-4186-967c-a600b7b6bd49" providerId="ADAL" clId="{6AFCFF47-415C-0F46-93A6-C1F844E9C1D0}" dt="2022-09-11T03:33:02.145" v="148" actId="478"/>
+          <ac:grpSpMkLst>
+            <pc:docMk/>
+            <pc:sldMk cId="3693280744" sldId="257"/>
+            <ac:grpSpMk id="17" creationId="{AB3A6DC8-A886-F68B-1D53-4E08FA085498}"/>
+          </ac:grpSpMkLst>
+        </pc:grpChg>
+        <pc:grpChg chg="add mod">
+          <ac:chgData name="Bo Lin" userId="e1efd623-6904-4186-967c-a600b7b6bd49" providerId="ADAL" clId="{6AFCFF47-415C-0F46-93A6-C1F844E9C1D0}" dt="2022-09-11T03:27:57.349" v="125" actId="164"/>
+          <ac:grpSpMkLst>
+            <pc:docMk/>
+            <pc:sldMk cId="3693280744" sldId="257"/>
+            <ac:grpSpMk id="52" creationId="{B707F187-DDEB-FE9E-EE49-B8E4C9C361C7}"/>
+          </ac:grpSpMkLst>
+        </pc:grpChg>
+        <pc:grpChg chg="add mod">
+          <ac:chgData name="Bo Lin" userId="e1efd623-6904-4186-967c-a600b7b6bd49" providerId="ADAL" clId="{6AFCFF47-415C-0F46-93A6-C1F844E9C1D0}" dt="2022-09-11T03:27:57.349" v="125" actId="164"/>
+          <ac:grpSpMkLst>
+            <pc:docMk/>
+            <pc:sldMk cId="3693280744" sldId="257"/>
+            <ac:grpSpMk id="58" creationId="{916DF286-39B2-3BA1-5E0E-00A360C1B400}"/>
+          </ac:grpSpMkLst>
+        </pc:grpChg>
+        <pc:grpChg chg="add mod">
+          <ac:chgData name="Bo Lin" userId="e1efd623-6904-4186-967c-a600b7b6bd49" providerId="ADAL" clId="{6AFCFF47-415C-0F46-93A6-C1F844E9C1D0}" dt="2022-09-11T03:27:40.804" v="122" actId="164"/>
+          <ac:grpSpMkLst>
+            <pc:docMk/>
+            <pc:sldMk cId="3693280744" sldId="257"/>
+            <ac:grpSpMk id="80" creationId="{C0A2E65E-F1F1-01B4-B52B-A2E1F2AB3066}"/>
+          </ac:grpSpMkLst>
+        </pc:grpChg>
+        <pc:grpChg chg="add mod">
+          <ac:chgData name="Bo Lin" userId="e1efd623-6904-4186-967c-a600b7b6bd49" providerId="ADAL" clId="{6AFCFF47-415C-0F46-93A6-C1F844E9C1D0}" dt="2022-09-11T04:10:53.288" v="344" actId="164"/>
+          <ac:grpSpMkLst>
+            <pc:docMk/>
+            <pc:sldMk cId="3693280744" sldId="257"/>
+            <ac:grpSpMk id="81" creationId="{271DBC9B-F019-2140-4471-D6A2BCDCF89A}"/>
+          </ac:grpSpMkLst>
+        </pc:grpChg>
+        <pc:grpChg chg="add del mod">
+          <ac:chgData name="Bo Lin" userId="e1efd623-6904-4186-967c-a600b7b6bd49" providerId="ADAL" clId="{6AFCFF47-415C-0F46-93A6-C1F844E9C1D0}" dt="2022-09-11T03:30:08.266" v="130"/>
+          <ac:grpSpMkLst>
+            <pc:docMk/>
+            <pc:sldMk cId="3693280744" sldId="257"/>
+            <ac:grpSpMk id="83" creationId="{10F28C5F-E2ED-AB95-37C6-16CC25C1AE82}"/>
+          </ac:grpSpMkLst>
+        </pc:grpChg>
+        <pc:grpChg chg="add mod topLvl">
+          <ac:chgData name="Bo Lin" userId="e1efd623-6904-4186-967c-a600b7b6bd49" providerId="ADAL" clId="{6AFCFF47-415C-0F46-93A6-C1F844E9C1D0}" dt="2022-09-11T04:05:43.098" v="282" actId="164"/>
+          <ac:grpSpMkLst>
+            <pc:docMk/>
+            <pc:sldMk cId="3693280744" sldId="257"/>
+            <ac:grpSpMk id="90" creationId="{706CD846-E11B-6E7E-657B-D20F62ADEFC5}"/>
+          </ac:grpSpMkLst>
+        </pc:grpChg>
+        <pc:grpChg chg="add mod topLvl">
+          <ac:chgData name="Bo Lin" userId="e1efd623-6904-4186-967c-a600b7b6bd49" providerId="ADAL" clId="{6AFCFF47-415C-0F46-93A6-C1F844E9C1D0}" dt="2022-09-11T04:05:43.098" v="282" actId="164"/>
+          <ac:grpSpMkLst>
+            <pc:docMk/>
+            <pc:sldMk cId="3693280744" sldId="257"/>
+            <ac:grpSpMk id="97" creationId="{930B8660-C618-C86D-0F5F-33A2E9844BA3}"/>
+          </ac:grpSpMkLst>
+        </pc:grpChg>
+        <pc:grpChg chg="add del mod">
+          <ac:chgData name="Bo Lin" userId="e1efd623-6904-4186-967c-a600b7b6bd49" providerId="ADAL" clId="{6AFCFF47-415C-0F46-93A6-C1F844E9C1D0}" dt="2022-09-11T03:33:26.990" v="151" actId="165"/>
+          <ac:grpSpMkLst>
+            <pc:docMk/>
+            <pc:sldMk cId="3693280744" sldId="257"/>
+            <ac:grpSpMk id="118" creationId="{2EE19CEA-7281-65BB-78B2-6608A0E7B57B}"/>
+          </ac:grpSpMkLst>
+        </pc:grpChg>
+        <pc:grpChg chg="add mod">
+          <ac:chgData name="Bo Lin" userId="e1efd623-6904-4186-967c-a600b7b6bd49" providerId="ADAL" clId="{6AFCFF47-415C-0F46-93A6-C1F844E9C1D0}" dt="2022-09-11T04:10:53.288" v="344" actId="164"/>
+          <ac:grpSpMkLst>
+            <pc:docMk/>
+            <pc:sldMk cId="3693280744" sldId="257"/>
+            <ac:grpSpMk id="129" creationId="{9B49D06A-EB09-5DE1-572D-F0920D3DC869}"/>
+          </ac:grpSpMkLst>
+        </pc:grpChg>
+        <pc:grpChg chg="add mod">
+          <ac:chgData name="Bo Lin" userId="e1efd623-6904-4186-967c-a600b7b6bd49" providerId="ADAL" clId="{6AFCFF47-415C-0F46-93A6-C1F844E9C1D0}" dt="2022-09-11T04:10:55.295" v="345" actId="1076"/>
+          <ac:grpSpMkLst>
+            <pc:docMk/>
+            <pc:sldMk cId="3693280744" sldId="257"/>
+            <ac:grpSpMk id="134" creationId="{34DB7A75-0150-58C2-CF76-54B217DD1608}"/>
+          </ac:grpSpMkLst>
+        </pc:grpChg>
+        <pc:picChg chg="mod topLvl">
+          <ac:chgData name="Bo Lin" userId="e1efd623-6904-4186-967c-a600b7b6bd49" providerId="ADAL" clId="{6AFCFF47-415C-0F46-93A6-C1F844E9C1D0}" dt="2022-09-11T03:27:57.349" v="125" actId="164"/>
+          <ac:picMkLst>
+            <pc:docMk/>
+            <pc:sldMk cId="3693280744" sldId="257"/>
+            <ac:picMk id="4" creationId="{7F2BE941-97C2-5D94-8483-C2CF61DA09D5}"/>
+          </ac:picMkLst>
+        </pc:picChg>
+        <pc:picChg chg="add mod">
+          <ac:chgData name="Bo Lin" userId="e1efd623-6904-4186-967c-a600b7b6bd49" providerId="ADAL" clId="{6AFCFF47-415C-0F46-93A6-C1F844E9C1D0}" dt="2022-09-11T03:27:57.349" v="125" actId="164"/>
+          <ac:picMkLst>
+            <pc:docMk/>
+            <pc:sldMk cId="3693280744" sldId="257"/>
+            <ac:picMk id="43" creationId="{B04315C8-6A5B-AC29-66E1-F0395129E4D8}"/>
+          </ac:picMkLst>
+        </pc:picChg>
+        <pc:picChg chg="add del mod">
+          <ac:chgData name="Bo Lin" userId="e1efd623-6904-4186-967c-a600b7b6bd49" providerId="ADAL" clId="{6AFCFF47-415C-0F46-93A6-C1F844E9C1D0}" dt="2022-09-11T03:32:46.115" v="144" actId="478"/>
+          <ac:picMkLst>
+            <pc:docMk/>
+            <pc:sldMk cId="3693280744" sldId="257"/>
+            <ac:picMk id="111" creationId="{3A0C37D8-8790-A5A7-463B-A5A1CAEC9B95}"/>
+          </ac:picMkLst>
+        </pc:picChg>
+        <pc:picChg chg="add mod topLvl">
+          <ac:chgData name="Bo Lin" userId="e1efd623-6904-4186-967c-a600b7b6bd49" providerId="ADAL" clId="{6AFCFF47-415C-0F46-93A6-C1F844E9C1D0}" dt="2022-09-11T04:05:43.098" v="282" actId="164"/>
+          <ac:picMkLst>
+            <pc:docMk/>
+            <pc:sldMk cId="3693280744" sldId="257"/>
+            <ac:picMk id="116" creationId="{1A349A5E-A5A8-AAC3-8264-DD880D4859DF}"/>
+          </ac:picMkLst>
+        </pc:picChg>
+        <pc:picChg chg="add mod">
+          <ac:chgData name="Bo Lin" userId="e1efd623-6904-4186-967c-a600b7b6bd49" providerId="ADAL" clId="{6AFCFF47-415C-0F46-93A6-C1F844E9C1D0}" dt="2022-09-11T04:10:53.288" v="344" actId="164"/>
+          <ac:picMkLst>
+            <pc:docMk/>
+            <pc:sldMk cId="3693280744" sldId="257"/>
+            <ac:picMk id="131" creationId="{C93A055B-34CA-371E-0469-9A527084697E}"/>
+          </ac:picMkLst>
+        </pc:picChg>
+        <pc:cxnChg chg="del mod topLvl">
+          <ac:chgData name="Bo Lin" userId="e1efd623-6904-4186-967c-a600b7b6bd49" providerId="ADAL" clId="{6AFCFF47-415C-0F46-93A6-C1F844E9C1D0}" dt="2022-09-11T03:17:16.559" v="10" actId="478"/>
+          <ac:cxnSpMkLst>
+            <pc:docMk/>
+            <pc:sldMk cId="3693280744" sldId="257"/>
+            <ac:cxnSpMk id="5" creationId="{FEF5CB6C-DFE4-8129-B96E-B493E1319599}"/>
+          </ac:cxnSpMkLst>
+        </pc:cxnChg>
+        <pc:cxnChg chg="add del mod topLvl">
+          <ac:chgData name="Bo Lin" userId="e1efd623-6904-4186-967c-a600b7b6bd49" providerId="ADAL" clId="{6AFCFF47-415C-0F46-93A6-C1F844E9C1D0}" dt="2022-09-11T03:33:02.145" v="148" actId="478"/>
+          <ac:cxnSpMkLst>
+            <pc:docMk/>
+            <pc:sldMk cId="3693280744" sldId="257"/>
+            <ac:cxnSpMk id="9" creationId="{AC7F5742-D6CE-721C-6262-40DFC5DBFD2B}"/>
+          </ac:cxnSpMkLst>
+        </pc:cxnChg>
+        <pc:cxnChg chg="add del mod topLvl">
+          <ac:chgData name="Bo Lin" userId="e1efd623-6904-4186-967c-a600b7b6bd49" providerId="ADAL" clId="{6AFCFF47-415C-0F46-93A6-C1F844E9C1D0}" dt="2022-09-11T03:33:02.145" v="148" actId="478"/>
+          <ac:cxnSpMkLst>
+            <pc:docMk/>
+            <pc:sldMk cId="3693280744" sldId="257"/>
+            <ac:cxnSpMk id="14" creationId="{B17E3392-C17E-005E-837E-72B3489B69BA}"/>
+          </ac:cxnSpMkLst>
+        </pc:cxnChg>
+        <pc:cxnChg chg="add del mod topLvl">
+          <ac:chgData name="Bo Lin" userId="e1efd623-6904-4186-967c-a600b7b6bd49" providerId="ADAL" clId="{6AFCFF47-415C-0F46-93A6-C1F844E9C1D0}" dt="2022-09-11T03:33:02.145" v="148" actId="478"/>
+          <ac:cxnSpMkLst>
+            <pc:docMk/>
+            <pc:sldMk cId="3693280744" sldId="257"/>
+            <ac:cxnSpMk id="15" creationId="{F8E997BF-7665-B189-D669-D952C1F81044}"/>
+          </ac:cxnSpMkLst>
+        </pc:cxnChg>
+        <pc:cxnChg chg="add del mod topLvl">
+          <ac:chgData name="Bo Lin" userId="e1efd623-6904-4186-967c-a600b7b6bd49" providerId="ADAL" clId="{6AFCFF47-415C-0F46-93A6-C1F844E9C1D0}" dt="2022-09-11T03:33:02.145" v="148" actId="478"/>
+          <ac:cxnSpMkLst>
+            <pc:docMk/>
+            <pc:sldMk cId="3693280744" sldId="257"/>
+            <ac:cxnSpMk id="16" creationId="{145ADAE7-59D9-19D0-8688-18C73917D3F8}"/>
+          </ac:cxnSpMkLst>
+        </pc:cxnChg>
+        <pc:cxnChg chg="add del mod topLvl">
+          <ac:chgData name="Bo Lin" userId="e1efd623-6904-4186-967c-a600b7b6bd49" providerId="ADAL" clId="{6AFCFF47-415C-0F46-93A6-C1F844E9C1D0}" dt="2022-09-11T03:33:02.145" v="148" actId="478"/>
+          <ac:cxnSpMkLst>
+            <pc:docMk/>
+            <pc:sldMk cId="3693280744" sldId="257"/>
+            <ac:cxnSpMk id="18" creationId="{A5F024F6-1710-3D58-03F5-547465B741F7}"/>
+          </ac:cxnSpMkLst>
+        </pc:cxnChg>
+        <pc:cxnChg chg="add del mod topLvl">
+          <ac:chgData name="Bo Lin" userId="e1efd623-6904-4186-967c-a600b7b6bd49" providerId="ADAL" clId="{6AFCFF47-415C-0F46-93A6-C1F844E9C1D0}" dt="2022-09-11T03:33:02.145" v="148" actId="478"/>
+          <ac:cxnSpMkLst>
+            <pc:docMk/>
+            <pc:sldMk cId="3693280744" sldId="257"/>
+            <ac:cxnSpMk id="22" creationId="{F8B149AB-948E-CD71-1862-40A191C64674}"/>
+          </ac:cxnSpMkLst>
+        </pc:cxnChg>
+        <pc:cxnChg chg="add del mod topLvl">
+          <ac:chgData name="Bo Lin" userId="e1efd623-6904-4186-967c-a600b7b6bd49" providerId="ADAL" clId="{6AFCFF47-415C-0F46-93A6-C1F844E9C1D0}" dt="2022-09-11T03:33:02.145" v="148" actId="478"/>
+          <ac:cxnSpMkLst>
+            <pc:docMk/>
+            <pc:sldMk cId="3693280744" sldId="257"/>
+            <ac:cxnSpMk id="24" creationId="{C556F00B-B850-521D-6B8F-B9C2D9233714}"/>
+          </ac:cxnSpMkLst>
+        </pc:cxnChg>
+        <pc:cxnChg chg="add mod">
+          <ac:chgData name="Bo Lin" userId="e1efd623-6904-4186-967c-a600b7b6bd49" providerId="ADAL" clId="{6AFCFF47-415C-0F46-93A6-C1F844E9C1D0}" dt="2022-09-11T03:27:57.349" v="125" actId="164"/>
+          <ac:cxnSpMkLst>
+            <pc:docMk/>
+            <pc:sldMk cId="3693280744" sldId="257"/>
+            <ac:cxnSpMk id="44" creationId="{59DE56ED-A2CA-338D-BAAD-D3D4398E6F3C}"/>
+          </ac:cxnSpMkLst>
+        </pc:cxnChg>
+        <pc:cxnChg chg="add mod">
+          <ac:chgData name="Bo Lin" userId="e1efd623-6904-4186-967c-a600b7b6bd49" providerId="ADAL" clId="{6AFCFF47-415C-0F46-93A6-C1F844E9C1D0}" dt="2022-09-11T03:27:57.349" v="125" actId="164"/>
+          <ac:cxnSpMkLst>
+            <pc:docMk/>
+            <pc:sldMk cId="3693280744" sldId="257"/>
+            <ac:cxnSpMk id="47" creationId="{55D45F3B-6F97-37C3-0BB7-56A070ABCF12}"/>
+          </ac:cxnSpMkLst>
+        </pc:cxnChg>
+        <pc:cxnChg chg="add mod">
+          <ac:chgData name="Bo Lin" userId="e1efd623-6904-4186-967c-a600b7b6bd49" providerId="ADAL" clId="{6AFCFF47-415C-0F46-93A6-C1F844E9C1D0}" dt="2022-09-11T03:27:57.349" v="125" actId="164"/>
+          <ac:cxnSpMkLst>
+            <pc:docMk/>
+            <pc:sldMk cId="3693280744" sldId="257"/>
+            <ac:cxnSpMk id="64" creationId="{BE0B4984-DDBF-F97C-87A9-1D5ADC6FCC63}"/>
+          </ac:cxnSpMkLst>
+        </pc:cxnChg>
+        <pc:cxnChg chg="add mod">
+          <ac:chgData name="Bo Lin" userId="e1efd623-6904-4186-967c-a600b7b6bd49" providerId="ADAL" clId="{6AFCFF47-415C-0F46-93A6-C1F844E9C1D0}" dt="2022-09-11T03:27:57.349" v="125" actId="164"/>
+          <ac:cxnSpMkLst>
+            <pc:docMk/>
+            <pc:sldMk cId="3693280744" sldId="257"/>
+            <ac:cxnSpMk id="67" creationId="{76869E9D-0354-C06C-C201-E059E46D661B}"/>
+          </ac:cxnSpMkLst>
+        </pc:cxnChg>
+        <pc:cxnChg chg="add mod">
+          <ac:chgData name="Bo Lin" userId="e1efd623-6904-4186-967c-a600b7b6bd49" providerId="ADAL" clId="{6AFCFF47-415C-0F46-93A6-C1F844E9C1D0}" dt="2022-09-11T03:27:57.349" v="125" actId="164"/>
+          <ac:cxnSpMkLst>
+            <pc:docMk/>
+            <pc:sldMk cId="3693280744" sldId="257"/>
+            <ac:cxnSpMk id="71" creationId="{271FF59B-115C-3FC7-0E38-52988F4EEFEA}"/>
+          </ac:cxnSpMkLst>
+        </pc:cxnChg>
+        <pc:cxnChg chg="add mod">
+          <ac:chgData name="Bo Lin" userId="e1efd623-6904-4186-967c-a600b7b6bd49" providerId="ADAL" clId="{6AFCFF47-415C-0F46-93A6-C1F844E9C1D0}" dt="2022-09-11T03:27:57.349" v="125" actId="164"/>
+          <ac:cxnSpMkLst>
+            <pc:docMk/>
+            <pc:sldMk cId="3693280744" sldId="257"/>
+            <ac:cxnSpMk id="74" creationId="{4D8096A3-6A34-4241-C004-30F324C3AE85}"/>
+          </ac:cxnSpMkLst>
+        </pc:cxnChg>
+        <pc:cxnChg chg="add mod topLvl">
+          <ac:chgData name="Bo Lin" userId="e1efd623-6904-4186-967c-a600b7b6bd49" providerId="ADAL" clId="{6AFCFF47-415C-0F46-93A6-C1F844E9C1D0}" dt="2022-09-11T04:05:43.098" v="282" actId="164"/>
+          <ac:cxnSpMkLst>
+            <pc:docMk/>
+            <pc:sldMk cId="3693280744" sldId="257"/>
+            <ac:cxnSpMk id="96" creationId="{5B7111F8-E828-49B6-A143-FDD42B0E9482}"/>
+          </ac:cxnSpMkLst>
+        </pc:cxnChg>
+        <pc:cxnChg chg="add mod topLvl">
+          <ac:chgData name="Bo Lin" userId="e1efd623-6904-4186-967c-a600b7b6bd49" providerId="ADAL" clId="{6AFCFF47-415C-0F46-93A6-C1F844E9C1D0}" dt="2022-09-11T04:05:43.098" v="282" actId="164"/>
+          <ac:cxnSpMkLst>
+            <pc:docMk/>
+            <pc:sldMk cId="3693280744" sldId="257"/>
+            <ac:cxnSpMk id="101" creationId="{A83BF8E6-9D10-3174-85E1-EFCE703E444B}"/>
+          </ac:cxnSpMkLst>
+        </pc:cxnChg>
+        <pc:cxnChg chg="add mod topLvl">
+          <ac:chgData name="Bo Lin" userId="e1efd623-6904-4186-967c-a600b7b6bd49" providerId="ADAL" clId="{6AFCFF47-415C-0F46-93A6-C1F844E9C1D0}" dt="2022-09-11T04:05:43.098" v="282" actId="164"/>
+          <ac:cxnSpMkLst>
+            <pc:docMk/>
+            <pc:sldMk cId="3693280744" sldId="257"/>
+            <ac:cxnSpMk id="103" creationId="{9EB58275-5082-D86E-7D0E-29A93AC8676E}"/>
+          </ac:cxnSpMkLst>
+        </pc:cxnChg>
+        <pc:cxnChg chg="add mod topLvl">
+          <ac:chgData name="Bo Lin" userId="e1efd623-6904-4186-967c-a600b7b6bd49" providerId="ADAL" clId="{6AFCFF47-415C-0F46-93A6-C1F844E9C1D0}" dt="2022-09-11T04:05:43.098" v="282" actId="164"/>
+          <ac:cxnSpMkLst>
+            <pc:docMk/>
+            <pc:sldMk cId="3693280744" sldId="257"/>
+            <ac:cxnSpMk id="105" creationId="{912F802E-9F5D-C60B-7586-B36211309D96}"/>
+          </ac:cxnSpMkLst>
+        </pc:cxnChg>
+        <pc:cxnChg chg="add mod topLvl">
+          <ac:chgData name="Bo Lin" userId="e1efd623-6904-4186-967c-a600b7b6bd49" providerId="ADAL" clId="{6AFCFF47-415C-0F46-93A6-C1F844E9C1D0}" dt="2022-09-11T04:05:43.098" v="282" actId="164"/>
+          <ac:cxnSpMkLst>
+            <pc:docMk/>
+            <pc:sldMk cId="3693280744" sldId="257"/>
+            <ac:cxnSpMk id="106" creationId="{D916F2B1-0C32-3649-5B5B-2CD69E7BD51A}"/>
+          </ac:cxnSpMkLst>
+        </pc:cxnChg>
+        <pc:cxnChg chg="add mod topLvl">
+          <ac:chgData name="Bo Lin" userId="e1efd623-6904-4186-967c-a600b7b6bd49" providerId="ADAL" clId="{6AFCFF47-415C-0F46-93A6-C1F844E9C1D0}" dt="2022-09-11T04:05:43.098" v="282" actId="164"/>
+          <ac:cxnSpMkLst>
+            <pc:docMk/>
+            <pc:sldMk cId="3693280744" sldId="257"/>
+            <ac:cxnSpMk id="112" creationId="{D488BDCD-6630-27AE-90DE-E726C492FE6B}"/>
+          </ac:cxnSpMkLst>
+        </pc:cxnChg>
+      </pc:sldChg>
+    </pc:docChg>
+  </pc:docChgLst>
+</pc:chgInfo>
 </file>
 
 <file path=ppt/slideLayouts/slideLayout1.xml><?xml version="1.0" encoding="utf-8"?>
@@ -263,7 +1097,7 @@
           <a:p>
             <a:fld id="{2FD196D0-345F-C549-BD97-D0B987B47290}" type="datetimeFigureOut">
               <a:rPr lang="en-US" smtClean="0"/>
-              <a:t>9/8/22</a:t>
+              <a:t>9/10/22</a:t>
             </a:fld>
             <a:endParaRPr lang="en-US"/>
           </a:p>
@@ -461,7 +1295,7 @@
           <a:p>
             <a:fld id="{2FD196D0-345F-C549-BD97-D0B987B47290}" type="datetimeFigureOut">
               <a:rPr lang="en-US" smtClean="0"/>
-              <a:t>9/8/22</a:t>
+              <a:t>9/10/22</a:t>
             </a:fld>
             <a:endParaRPr lang="en-US"/>
           </a:p>
@@ -669,7 +1503,7 @@
           <a:p>
             <a:fld id="{2FD196D0-345F-C549-BD97-D0B987B47290}" type="datetimeFigureOut">
               <a:rPr lang="en-US" smtClean="0"/>
-              <a:t>9/8/22</a:t>
+              <a:t>9/10/22</a:t>
             </a:fld>
             <a:endParaRPr lang="en-US"/>
           </a:p>
@@ -867,7 +1701,7 @@
           <a:p>
             <a:fld id="{2FD196D0-345F-C549-BD97-D0B987B47290}" type="datetimeFigureOut">
               <a:rPr lang="en-US" smtClean="0"/>
-              <a:t>9/8/22</a:t>
+              <a:t>9/10/22</a:t>
             </a:fld>
             <a:endParaRPr lang="en-US"/>
           </a:p>
@@ -1142,7 +1976,7 @@
           <a:p>
             <a:fld id="{2FD196D0-345F-C549-BD97-D0B987B47290}" type="datetimeFigureOut">
               <a:rPr lang="en-US" smtClean="0"/>
-              <a:t>9/8/22</a:t>
+              <a:t>9/10/22</a:t>
             </a:fld>
             <a:endParaRPr lang="en-US"/>
           </a:p>
@@ -1407,7 +2241,7 @@
           <a:p>
             <a:fld id="{2FD196D0-345F-C549-BD97-D0B987B47290}" type="datetimeFigureOut">
               <a:rPr lang="en-US" smtClean="0"/>
-              <a:t>9/8/22</a:t>
+              <a:t>9/10/22</a:t>
             </a:fld>
             <a:endParaRPr lang="en-US"/>
           </a:p>
@@ -1819,7 +2653,7 @@
           <a:p>
             <a:fld id="{2FD196D0-345F-C549-BD97-D0B987B47290}" type="datetimeFigureOut">
               <a:rPr lang="en-US" smtClean="0"/>
-              <a:t>9/8/22</a:t>
+              <a:t>9/10/22</a:t>
             </a:fld>
             <a:endParaRPr lang="en-US"/>
           </a:p>
@@ -1960,7 +2794,7 @@
           <a:p>
             <a:fld id="{2FD196D0-345F-C549-BD97-D0B987B47290}" type="datetimeFigureOut">
               <a:rPr lang="en-US" smtClean="0"/>
-              <a:t>9/8/22</a:t>
+              <a:t>9/10/22</a:t>
             </a:fld>
             <a:endParaRPr lang="en-US"/>
           </a:p>
@@ -2073,7 +2907,7 @@
           <a:p>
             <a:fld id="{2FD196D0-345F-C549-BD97-D0B987B47290}" type="datetimeFigureOut">
               <a:rPr lang="en-US" smtClean="0"/>
-              <a:t>9/8/22</a:t>
+              <a:t>9/10/22</a:t>
             </a:fld>
             <a:endParaRPr lang="en-US"/>
           </a:p>
@@ -2384,7 +3218,7 @@
           <a:p>
             <a:fld id="{2FD196D0-345F-C549-BD97-D0B987B47290}" type="datetimeFigureOut">
               <a:rPr lang="en-US" smtClean="0"/>
-              <a:t>9/8/22</a:t>
+              <a:t>9/10/22</a:t>
             </a:fld>
             <a:endParaRPr lang="en-US"/>
           </a:p>
@@ -2672,7 +3506,7 @@
           <a:p>
             <a:fld id="{2FD196D0-345F-C549-BD97-D0B987B47290}" type="datetimeFigureOut">
               <a:rPr lang="en-US" smtClean="0"/>
-              <a:t>9/8/22</a:t>
+              <a:t>9/10/22</a:t>
             </a:fld>
             <a:endParaRPr lang="en-US"/>
           </a:p>
@@ -2913,7 +3747,7 @@
           <a:p>
             <a:fld id="{2FD196D0-345F-C549-BD97-D0B987B47290}" type="datetimeFigureOut">
               <a:rPr lang="en-US" smtClean="0"/>
-              <a:t>9/8/22</a:t>
+              <a:t>9/10/22</a:t>
             </a:fld>
             <a:endParaRPr lang="en-US"/>
           </a:p>
@@ -5245,6 +6079,2439 @@
           <a:chExt cx="0" cy="0"/>
         </a:xfrm>
       </p:grpSpPr>
+      <p:grpSp>
+        <p:nvGrpSpPr>
+          <p:cNvPr id="134" name="Group 133">
+            <a:extLst>
+              <a:ext uri="{FF2B5EF4-FFF2-40B4-BE49-F238E27FC236}">
+                <a16:creationId xmlns:a16="http://schemas.microsoft.com/office/drawing/2014/main" id="{34DB7A75-0150-58C2-CF76-54B217DD1608}"/>
+              </a:ext>
+            </a:extLst>
+          </p:cNvPr>
+          <p:cNvGrpSpPr/>
+          <p:nvPr/>
+        </p:nvGrpSpPr>
+        <p:grpSpPr>
+          <a:xfrm>
+            <a:off x="596349" y="464404"/>
+            <a:ext cx="7431629" cy="5802431"/>
+            <a:chOff x="1446455" y="414398"/>
+            <a:chExt cx="7431629" cy="5802431"/>
+          </a:xfrm>
+        </p:grpSpPr>
+        <p:grpSp>
+          <p:nvGrpSpPr>
+            <p:cNvPr id="81" name="Group 80">
+              <a:extLst>
+                <a:ext uri="{FF2B5EF4-FFF2-40B4-BE49-F238E27FC236}">
+                  <a16:creationId xmlns:a16="http://schemas.microsoft.com/office/drawing/2014/main" id="{271DBC9B-F019-2140-4471-D6A2BCDCF89A}"/>
+                </a:ext>
+              </a:extLst>
+            </p:cNvPr>
+            <p:cNvGrpSpPr/>
+            <p:nvPr/>
+          </p:nvGrpSpPr>
+          <p:grpSpPr>
+            <a:xfrm>
+              <a:off x="3801100" y="414398"/>
+              <a:ext cx="4589799" cy="1827562"/>
+              <a:chOff x="2365246" y="3007426"/>
+              <a:chExt cx="4589799" cy="1827562"/>
+            </a:xfrm>
+          </p:grpSpPr>
+          <p:pic>
+            <p:nvPicPr>
+              <p:cNvPr id="4" name="Picture 3" descr="A street with cars on it and buildings in the back&#10;&#10;Description automatically generated with medium confidence">
+                <a:extLst>
+                  <a:ext uri="{FF2B5EF4-FFF2-40B4-BE49-F238E27FC236}">
+                    <a16:creationId xmlns:a16="http://schemas.microsoft.com/office/drawing/2014/main" id="{7F2BE941-97C2-5D94-8483-C2CF61DA09D5}"/>
+                  </a:ext>
+                </a:extLst>
+              </p:cNvPr>
+              <p:cNvPicPr>
+                <a:picLocks noChangeAspect="1"/>
+              </p:cNvPicPr>
+              <p:nvPr/>
+            </p:nvPicPr>
+            <p:blipFill>
+              <a:blip r:embed="rId2"/>
+              <a:stretch>
+                <a:fillRect/>
+              </a:stretch>
+            </p:blipFill>
+            <p:spPr>
+              <a:xfrm>
+                <a:off x="2365246" y="3007426"/>
+                <a:ext cx="843147" cy="843147"/>
+              </a:xfrm>
+              <a:prstGeom prst="rect">
+                <a:avLst/>
+              </a:prstGeom>
+              <a:ln w="12700" cap="sq">
+                <a:solidFill>
+                  <a:srgbClr val="000000"/>
+                </a:solidFill>
+                <a:miter lim="800000"/>
+              </a:ln>
+              <a:effectLst>
+                <a:outerShdw blurRad="57150" dist="50800" dir="2700000" algn="tl" rotWithShape="0">
+                  <a:srgbClr val="000000">
+                    <a:alpha val="40000"/>
+                  </a:srgbClr>
+                </a:outerShdw>
+              </a:effectLst>
+            </p:spPr>
+          </p:pic>
+          <p:sp>
+            <p:nvSpPr>
+              <p:cNvPr id="40" name="Rounded Rectangle 39">
+                <a:extLst>
+                  <a:ext uri="{FF2B5EF4-FFF2-40B4-BE49-F238E27FC236}">
+                    <a16:creationId xmlns:a16="http://schemas.microsoft.com/office/drawing/2014/main" id="{153127A0-21BC-1BD9-207A-E08FBC8C0EDB}"/>
+                  </a:ext>
+                </a:extLst>
+              </p:cNvPr>
+              <p:cNvSpPr/>
+              <p:nvPr/>
+            </p:nvSpPr>
+            <p:spPr>
+              <a:xfrm rot="5400000">
+                <a:off x="3126657" y="3588777"/>
+                <a:ext cx="1827561" cy="664862"/>
+              </a:xfrm>
+              <a:prstGeom prst="roundRect">
+                <a:avLst/>
+              </a:prstGeom>
+              <a:solidFill>
+                <a:srgbClr val="0070C0"/>
+              </a:solidFill>
+              <a:ln w="28575">
+                <a:solidFill>
+                  <a:schemeClr val="tx1">
+                    <a:lumMod val="85000"/>
+                    <a:lumOff val="15000"/>
+                  </a:schemeClr>
+                </a:solidFill>
+              </a:ln>
+            </p:spPr>
+            <p:style>
+              <a:lnRef idx="2">
+                <a:schemeClr val="accent1">
+                  <a:shade val="50000"/>
+                </a:schemeClr>
+              </a:lnRef>
+              <a:fillRef idx="1">
+                <a:schemeClr val="accent1"/>
+              </a:fillRef>
+              <a:effectRef idx="0">
+                <a:schemeClr val="accent1"/>
+              </a:effectRef>
+              <a:fontRef idx="minor">
+                <a:schemeClr val="lt1"/>
+              </a:fontRef>
+            </p:style>
+            <p:txBody>
+              <a:bodyPr rtlCol="0" anchor="ctr"/>
+              <a:lstStyle/>
+              <a:p>
+                <a:pPr algn="ctr"/>
+                <a:r>
+                  <a:rPr lang="en-US" dirty="0"/>
+                  <a:t>Neural Network</a:t>
+                </a:r>
+              </a:p>
+            </p:txBody>
+          </p:sp>
+          <p:pic>
+            <p:nvPicPr>
+              <p:cNvPr id="43" name="Picture 42" descr="A street with houses along it&#10;&#10;Description automatically generated with low confidence">
+                <a:extLst>
+                  <a:ext uri="{FF2B5EF4-FFF2-40B4-BE49-F238E27FC236}">
+                    <a16:creationId xmlns:a16="http://schemas.microsoft.com/office/drawing/2014/main" id="{B04315C8-6A5B-AC29-66E1-F0395129E4D8}"/>
+                  </a:ext>
+                </a:extLst>
+              </p:cNvPr>
+              <p:cNvPicPr>
+                <a:picLocks noChangeAspect="1"/>
+              </p:cNvPicPr>
+              <p:nvPr/>
+            </p:nvPicPr>
+            <p:blipFill>
+              <a:blip r:embed="rId3"/>
+              <a:stretch>
+                <a:fillRect/>
+              </a:stretch>
+            </p:blipFill>
+            <p:spPr>
+              <a:xfrm>
+                <a:off x="2365246" y="3991838"/>
+                <a:ext cx="843147" cy="843147"/>
+              </a:xfrm>
+              <a:prstGeom prst="rect">
+                <a:avLst/>
+              </a:prstGeom>
+              <a:ln w="12700" cap="sq">
+                <a:solidFill>
+                  <a:srgbClr val="000000"/>
+                </a:solidFill>
+                <a:miter lim="800000"/>
+              </a:ln>
+              <a:effectLst>
+                <a:outerShdw blurRad="57150" dist="50800" dir="2700000" algn="tl" rotWithShape="0">
+                  <a:srgbClr val="000000">
+                    <a:alpha val="40000"/>
+                  </a:srgbClr>
+                </a:outerShdw>
+              </a:effectLst>
+            </p:spPr>
+          </p:pic>
+          <p:cxnSp>
+            <p:nvCxnSpPr>
+              <p:cNvPr id="44" name="Straight Arrow Connector 43">
+                <a:extLst>
+                  <a:ext uri="{FF2B5EF4-FFF2-40B4-BE49-F238E27FC236}">
+                    <a16:creationId xmlns:a16="http://schemas.microsoft.com/office/drawing/2014/main" id="{59DE56ED-A2CA-338D-BAAD-D3D4398E6F3C}"/>
+                  </a:ext>
+                </a:extLst>
+              </p:cNvPr>
+              <p:cNvCxnSpPr>
+                <a:cxnSpLocks/>
+                <a:stCxn id="4" idx="3"/>
+              </p:cNvCxnSpPr>
+              <p:nvPr/>
+            </p:nvCxnSpPr>
+            <p:spPr>
+              <a:xfrm>
+                <a:off x="3208393" y="3429000"/>
+                <a:ext cx="499613" cy="0"/>
+              </a:xfrm>
+              <a:prstGeom prst="straightConnector1">
+                <a:avLst/>
+              </a:prstGeom>
+              <a:ln w="28575">
+                <a:solidFill>
+                  <a:schemeClr val="tx1">
+                    <a:lumMod val="85000"/>
+                    <a:lumOff val="15000"/>
+                  </a:schemeClr>
+                </a:solidFill>
+                <a:tailEnd type="triangle"/>
+              </a:ln>
+            </p:spPr>
+            <p:style>
+              <a:lnRef idx="1">
+                <a:schemeClr val="accent1"/>
+              </a:lnRef>
+              <a:fillRef idx="0">
+                <a:schemeClr val="accent1"/>
+              </a:fillRef>
+              <a:effectRef idx="0">
+                <a:schemeClr val="accent1"/>
+              </a:effectRef>
+              <a:fontRef idx="minor">
+                <a:schemeClr val="tx1"/>
+              </a:fontRef>
+            </p:style>
+          </p:cxnSp>
+          <p:cxnSp>
+            <p:nvCxnSpPr>
+              <p:cNvPr id="47" name="Straight Arrow Connector 46">
+                <a:extLst>
+                  <a:ext uri="{FF2B5EF4-FFF2-40B4-BE49-F238E27FC236}">
+                    <a16:creationId xmlns:a16="http://schemas.microsoft.com/office/drawing/2014/main" id="{55D45F3B-6F97-37C3-0BB7-56A070ABCF12}"/>
+                  </a:ext>
+                </a:extLst>
+              </p:cNvPr>
+              <p:cNvCxnSpPr>
+                <a:cxnSpLocks/>
+                <a:stCxn id="43" idx="3"/>
+              </p:cNvCxnSpPr>
+              <p:nvPr/>
+            </p:nvCxnSpPr>
+            <p:spPr>
+              <a:xfrm>
+                <a:off x="3208393" y="4413412"/>
+                <a:ext cx="499613" cy="0"/>
+              </a:xfrm>
+              <a:prstGeom prst="straightConnector1">
+                <a:avLst/>
+              </a:prstGeom>
+              <a:ln w="28575">
+                <a:solidFill>
+                  <a:schemeClr val="tx1">
+                    <a:lumMod val="85000"/>
+                    <a:lumOff val="15000"/>
+                  </a:schemeClr>
+                </a:solidFill>
+                <a:tailEnd type="triangle"/>
+              </a:ln>
+            </p:spPr>
+            <p:style>
+              <a:lnRef idx="1">
+                <a:schemeClr val="accent1"/>
+              </a:lnRef>
+              <a:fillRef idx="0">
+                <a:schemeClr val="accent1"/>
+              </a:fillRef>
+              <a:effectRef idx="0">
+                <a:schemeClr val="accent1"/>
+              </a:effectRef>
+              <a:fontRef idx="minor">
+                <a:schemeClr val="tx1"/>
+              </a:fontRef>
+            </p:style>
+          </p:cxnSp>
+          <p:grpSp>
+            <p:nvGrpSpPr>
+              <p:cNvPr id="52" name="Group 51">
+                <a:extLst>
+                  <a:ext uri="{FF2B5EF4-FFF2-40B4-BE49-F238E27FC236}">
+                    <a16:creationId xmlns:a16="http://schemas.microsoft.com/office/drawing/2014/main" id="{B707F187-DDEB-FE9E-EE49-B8E4C9C361C7}"/>
+                  </a:ext>
+                </a:extLst>
+              </p:cNvPr>
+              <p:cNvGrpSpPr/>
+              <p:nvPr/>
+            </p:nvGrpSpPr>
+            <p:grpSpPr>
+              <a:xfrm>
+                <a:off x="4872482" y="3007426"/>
+                <a:ext cx="148442" cy="742210"/>
+                <a:chOff x="5717969" y="3553634"/>
+                <a:chExt cx="148442" cy="742210"/>
+              </a:xfrm>
+            </p:grpSpPr>
+            <p:sp>
+              <p:nvSpPr>
+                <p:cNvPr id="53" name="Rectangle 52">
+                  <a:extLst>
+                    <a:ext uri="{FF2B5EF4-FFF2-40B4-BE49-F238E27FC236}">
+                      <a16:creationId xmlns:a16="http://schemas.microsoft.com/office/drawing/2014/main" id="{3C488E65-5267-D0D3-20FD-55B7565056E6}"/>
+                    </a:ext>
+                  </a:extLst>
+                </p:cNvPr>
+                <p:cNvSpPr/>
+                <p:nvPr/>
+              </p:nvSpPr>
+              <p:spPr>
+                <a:xfrm>
+                  <a:off x="5717969" y="3553634"/>
+                  <a:ext cx="148442" cy="148442"/>
+                </a:xfrm>
+                <a:prstGeom prst="rect">
+                  <a:avLst/>
+                </a:prstGeom>
+                <a:solidFill>
+                  <a:srgbClr val="FFC000"/>
+                </a:solidFill>
+                <a:ln w="28575">
+                  <a:solidFill>
+                    <a:schemeClr val="tx1">
+                      <a:lumMod val="85000"/>
+                      <a:lumOff val="15000"/>
+                    </a:schemeClr>
+                  </a:solidFill>
+                </a:ln>
+              </p:spPr>
+              <p:style>
+                <a:lnRef idx="2">
+                  <a:schemeClr val="accent1">
+                    <a:shade val="50000"/>
+                  </a:schemeClr>
+                </a:lnRef>
+                <a:fillRef idx="1">
+                  <a:schemeClr val="accent1"/>
+                </a:fillRef>
+                <a:effectRef idx="0">
+                  <a:schemeClr val="accent1"/>
+                </a:effectRef>
+                <a:fontRef idx="minor">
+                  <a:schemeClr val="lt1"/>
+                </a:fontRef>
+              </p:style>
+              <p:txBody>
+                <a:bodyPr rtlCol="0" anchor="ctr"/>
+                <a:lstStyle/>
+                <a:p>
+                  <a:pPr algn="ctr"/>
+                  <a:endParaRPr lang="en-US" dirty="0"/>
+                </a:p>
+              </p:txBody>
+            </p:sp>
+            <p:sp>
+              <p:nvSpPr>
+                <p:cNvPr id="54" name="Rectangle 53">
+                  <a:extLst>
+                    <a:ext uri="{FF2B5EF4-FFF2-40B4-BE49-F238E27FC236}">
+                      <a16:creationId xmlns:a16="http://schemas.microsoft.com/office/drawing/2014/main" id="{A8BAE91B-BA5C-4383-87DF-3C96C8405EC5}"/>
+                    </a:ext>
+                  </a:extLst>
+                </p:cNvPr>
+                <p:cNvSpPr/>
+                <p:nvPr/>
+              </p:nvSpPr>
+              <p:spPr>
+                <a:xfrm>
+                  <a:off x="5717969" y="3702076"/>
+                  <a:ext cx="148442" cy="148442"/>
+                </a:xfrm>
+                <a:prstGeom prst="rect">
+                  <a:avLst/>
+                </a:prstGeom>
+                <a:solidFill>
+                  <a:srgbClr val="92D050"/>
+                </a:solidFill>
+                <a:ln w="28575">
+                  <a:solidFill>
+                    <a:schemeClr val="tx1">
+                      <a:lumMod val="85000"/>
+                      <a:lumOff val="15000"/>
+                    </a:schemeClr>
+                  </a:solidFill>
+                </a:ln>
+              </p:spPr>
+              <p:style>
+                <a:lnRef idx="2">
+                  <a:schemeClr val="accent1">
+                    <a:shade val="50000"/>
+                  </a:schemeClr>
+                </a:lnRef>
+                <a:fillRef idx="1">
+                  <a:schemeClr val="accent1"/>
+                </a:fillRef>
+                <a:effectRef idx="0">
+                  <a:schemeClr val="accent1"/>
+                </a:effectRef>
+                <a:fontRef idx="minor">
+                  <a:schemeClr val="lt1"/>
+                </a:fontRef>
+              </p:style>
+              <p:txBody>
+                <a:bodyPr rtlCol="0" anchor="ctr"/>
+                <a:lstStyle/>
+                <a:p>
+                  <a:pPr algn="ctr"/>
+                  <a:endParaRPr lang="en-US"/>
+                </a:p>
+              </p:txBody>
+            </p:sp>
+            <p:sp>
+              <p:nvSpPr>
+                <p:cNvPr id="55" name="Rectangle 54">
+                  <a:extLst>
+                    <a:ext uri="{FF2B5EF4-FFF2-40B4-BE49-F238E27FC236}">
+                      <a16:creationId xmlns:a16="http://schemas.microsoft.com/office/drawing/2014/main" id="{32F936B3-4E3C-19B8-A18D-C0688CEF0230}"/>
+                    </a:ext>
+                  </a:extLst>
+                </p:cNvPr>
+                <p:cNvSpPr/>
+                <p:nvPr/>
+              </p:nvSpPr>
+              <p:spPr>
+                <a:xfrm>
+                  <a:off x="5717969" y="3850518"/>
+                  <a:ext cx="148442" cy="148442"/>
+                </a:xfrm>
+                <a:prstGeom prst="rect">
+                  <a:avLst/>
+                </a:prstGeom>
+                <a:solidFill>
+                  <a:srgbClr val="FF0000"/>
+                </a:solidFill>
+                <a:ln w="28575">
+                  <a:solidFill>
+                    <a:schemeClr val="tx1">
+                      <a:lumMod val="85000"/>
+                      <a:lumOff val="15000"/>
+                    </a:schemeClr>
+                  </a:solidFill>
+                </a:ln>
+              </p:spPr>
+              <p:style>
+                <a:lnRef idx="2">
+                  <a:schemeClr val="accent1">
+                    <a:shade val="50000"/>
+                  </a:schemeClr>
+                </a:lnRef>
+                <a:fillRef idx="1">
+                  <a:schemeClr val="accent1"/>
+                </a:fillRef>
+                <a:effectRef idx="0">
+                  <a:schemeClr val="accent1"/>
+                </a:effectRef>
+                <a:fontRef idx="minor">
+                  <a:schemeClr val="lt1"/>
+                </a:fontRef>
+              </p:style>
+              <p:txBody>
+                <a:bodyPr rtlCol="0" anchor="ctr"/>
+                <a:lstStyle/>
+                <a:p>
+                  <a:pPr algn="ctr"/>
+                  <a:endParaRPr lang="en-US"/>
+                </a:p>
+              </p:txBody>
+            </p:sp>
+            <p:sp>
+              <p:nvSpPr>
+                <p:cNvPr id="56" name="Rectangle 55">
+                  <a:extLst>
+                    <a:ext uri="{FF2B5EF4-FFF2-40B4-BE49-F238E27FC236}">
+                      <a16:creationId xmlns:a16="http://schemas.microsoft.com/office/drawing/2014/main" id="{9EEB7175-AA14-D50E-6DD1-809B1B4DFA6B}"/>
+                    </a:ext>
+                  </a:extLst>
+                </p:cNvPr>
+                <p:cNvSpPr/>
+                <p:nvPr/>
+              </p:nvSpPr>
+              <p:spPr>
+                <a:xfrm>
+                  <a:off x="5717969" y="4001334"/>
+                  <a:ext cx="148442" cy="148442"/>
+                </a:xfrm>
+                <a:prstGeom prst="rect">
+                  <a:avLst/>
+                </a:prstGeom>
+                <a:solidFill>
+                  <a:schemeClr val="bg1"/>
+                </a:solidFill>
+                <a:ln w="28575">
+                  <a:solidFill>
+                    <a:schemeClr val="tx1">
+                      <a:lumMod val="85000"/>
+                      <a:lumOff val="15000"/>
+                    </a:schemeClr>
+                  </a:solidFill>
+                </a:ln>
+              </p:spPr>
+              <p:style>
+                <a:lnRef idx="2">
+                  <a:schemeClr val="accent1">
+                    <a:shade val="50000"/>
+                  </a:schemeClr>
+                </a:lnRef>
+                <a:fillRef idx="1">
+                  <a:schemeClr val="accent1"/>
+                </a:fillRef>
+                <a:effectRef idx="0">
+                  <a:schemeClr val="accent1"/>
+                </a:effectRef>
+                <a:fontRef idx="minor">
+                  <a:schemeClr val="lt1"/>
+                </a:fontRef>
+              </p:style>
+              <p:txBody>
+                <a:bodyPr rtlCol="0" anchor="ctr"/>
+                <a:lstStyle/>
+                <a:p>
+                  <a:pPr algn="ctr"/>
+                  <a:endParaRPr lang="en-US" dirty="0"/>
+                </a:p>
+              </p:txBody>
+            </p:sp>
+            <p:sp>
+              <p:nvSpPr>
+                <p:cNvPr id="57" name="Rectangle 56">
+                  <a:extLst>
+                    <a:ext uri="{FF2B5EF4-FFF2-40B4-BE49-F238E27FC236}">
+                      <a16:creationId xmlns:a16="http://schemas.microsoft.com/office/drawing/2014/main" id="{4F9475ED-F410-F420-4925-0D26C680B052}"/>
+                    </a:ext>
+                  </a:extLst>
+                </p:cNvPr>
+                <p:cNvSpPr/>
+                <p:nvPr/>
+              </p:nvSpPr>
+              <p:spPr>
+                <a:xfrm>
+                  <a:off x="5717969" y="4147402"/>
+                  <a:ext cx="148442" cy="148442"/>
+                </a:xfrm>
+                <a:prstGeom prst="rect">
+                  <a:avLst/>
+                </a:prstGeom>
+                <a:solidFill>
+                  <a:srgbClr val="0070C0"/>
+                </a:solidFill>
+                <a:ln w="28575">
+                  <a:solidFill>
+                    <a:schemeClr val="tx1">
+                      <a:lumMod val="85000"/>
+                      <a:lumOff val="15000"/>
+                    </a:schemeClr>
+                  </a:solidFill>
+                </a:ln>
+              </p:spPr>
+              <p:style>
+                <a:lnRef idx="2">
+                  <a:schemeClr val="accent1">
+                    <a:shade val="50000"/>
+                  </a:schemeClr>
+                </a:lnRef>
+                <a:fillRef idx="1">
+                  <a:schemeClr val="accent1"/>
+                </a:fillRef>
+                <a:effectRef idx="0">
+                  <a:schemeClr val="accent1"/>
+                </a:effectRef>
+                <a:fontRef idx="minor">
+                  <a:schemeClr val="lt1"/>
+                </a:fontRef>
+              </p:style>
+              <p:txBody>
+                <a:bodyPr rtlCol="0" anchor="ctr"/>
+                <a:lstStyle/>
+                <a:p>
+                  <a:pPr algn="ctr"/>
+                  <a:endParaRPr lang="en-US"/>
+                </a:p>
+              </p:txBody>
+            </p:sp>
+          </p:grpSp>
+          <p:grpSp>
+            <p:nvGrpSpPr>
+              <p:cNvPr id="58" name="Group 57">
+                <a:extLst>
+                  <a:ext uri="{FF2B5EF4-FFF2-40B4-BE49-F238E27FC236}">
+                    <a16:creationId xmlns:a16="http://schemas.microsoft.com/office/drawing/2014/main" id="{916DF286-39B2-3BA1-5E0E-00A360C1B400}"/>
+                  </a:ext>
+                </a:extLst>
+              </p:cNvPr>
+              <p:cNvGrpSpPr/>
+              <p:nvPr/>
+            </p:nvGrpSpPr>
+            <p:grpSpPr>
+              <a:xfrm>
+                <a:off x="4872482" y="4042307"/>
+                <a:ext cx="148442" cy="742210"/>
+                <a:chOff x="5717969" y="3553634"/>
+                <a:chExt cx="148442" cy="742210"/>
+              </a:xfrm>
+            </p:grpSpPr>
+            <p:sp>
+              <p:nvSpPr>
+                <p:cNvPr id="59" name="Rectangle 58">
+                  <a:extLst>
+                    <a:ext uri="{FF2B5EF4-FFF2-40B4-BE49-F238E27FC236}">
+                      <a16:creationId xmlns:a16="http://schemas.microsoft.com/office/drawing/2014/main" id="{951D50D7-FDE5-C8A2-EC41-6A402109BB76}"/>
+                    </a:ext>
+                  </a:extLst>
+                </p:cNvPr>
+                <p:cNvSpPr/>
+                <p:nvPr/>
+              </p:nvSpPr>
+              <p:spPr>
+                <a:xfrm>
+                  <a:off x="5717969" y="3553634"/>
+                  <a:ext cx="148442" cy="148442"/>
+                </a:xfrm>
+                <a:prstGeom prst="rect">
+                  <a:avLst/>
+                </a:prstGeom>
+                <a:solidFill>
+                  <a:schemeClr val="accent2"/>
+                </a:solidFill>
+                <a:ln w="28575">
+                  <a:solidFill>
+                    <a:schemeClr val="tx1">
+                      <a:lumMod val="85000"/>
+                      <a:lumOff val="15000"/>
+                    </a:schemeClr>
+                  </a:solidFill>
+                </a:ln>
+              </p:spPr>
+              <p:style>
+                <a:lnRef idx="2">
+                  <a:schemeClr val="accent1">
+                    <a:shade val="50000"/>
+                  </a:schemeClr>
+                </a:lnRef>
+                <a:fillRef idx="1">
+                  <a:schemeClr val="accent1"/>
+                </a:fillRef>
+                <a:effectRef idx="0">
+                  <a:schemeClr val="accent1"/>
+                </a:effectRef>
+                <a:fontRef idx="minor">
+                  <a:schemeClr val="lt1"/>
+                </a:fontRef>
+              </p:style>
+              <p:txBody>
+                <a:bodyPr rtlCol="0" anchor="ctr"/>
+                <a:lstStyle/>
+                <a:p>
+                  <a:pPr algn="ctr"/>
+                  <a:endParaRPr lang="en-US"/>
+                </a:p>
+              </p:txBody>
+            </p:sp>
+            <p:sp>
+              <p:nvSpPr>
+                <p:cNvPr id="60" name="Rectangle 59">
+                  <a:extLst>
+                    <a:ext uri="{FF2B5EF4-FFF2-40B4-BE49-F238E27FC236}">
+                      <a16:creationId xmlns:a16="http://schemas.microsoft.com/office/drawing/2014/main" id="{F9F8B00F-D346-34A7-CE31-637BC7714A36}"/>
+                    </a:ext>
+                  </a:extLst>
+                </p:cNvPr>
+                <p:cNvSpPr/>
+                <p:nvPr/>
+              </p:nvSpPr>
+              <p:spPr>
+                <a:xfrm>
+                  <a:off x="5717969" y="3702076"/>
+                  <a:ext cx="148442" cy="148442"/>
+                </a:xfrm>
+                <a:prstGeom prst="rect">
+                  <a:avLst/>
+                </a:prstGeom>
+                <a:solidFill>
+                  <a:srgbClr val="0070C0"/>
+                </a:solidFill>
+                <a:ln w="28575">
+                  <a:solidFill>
+                    <a:schemeClr val="tx1">
+                      <a:lumMod val="85000"/>
+                      <a:lumOff val="15000"/>
+                    </a:schemeClr>
+                  </a:solidFill>
+                </a:ln>
+              </p:spPr>
+              <p:style>
+                <a:lnRef idx="2">
+                  <a:schemeClr val="accent1">
+                    <a:shade val="50000"/>
+                  </a:schemeClr>
+                </a:lnRef>
+                <a:fillRef idx="1">
+                  <a:schemeClr val="accent1"/>
+                </a:fillRef>
+                <a:effectRef idx="0">
+                  <a:schemeClr val="accent1"/>
+                </a:effectRef>
+                <a:fontRef idx="minor">
+                  <a:schemeClr val="lt1"/>
+                </a:fontRef>
+              </p:style>
+              <p:txBody>
+                <a:bodyPr rtlCol="0" anchor="ctr"/>
+                <a:lstStyle/>
+                <a:p>
+                  <a:pPr algn="ctr"/>
+                  <a:endParaRPr lang="en-US"/>
+                </a:p>
+              </p:txBody>
+            </p:sp>
+            <p:sp>
+              <p:nvSpPr>
+                <p:cNvPr id="61" name="Rectangle 60">
+                  <a:extLst>
+                    <a:ext uri="{FF2B5EF4-FFF2-40B4-BE49-F238E27FC236}">
+                      <a16:creationId xmlns:a16="http://schemas.microsoft.com/office/drawing/2014/main" id="{595B1413-1D67-66E4-7916-BCFE74D79A04}"/>
+                    </a:ext>
+                  </a:extLst>
+                </p:cNvPr>
+                <p:cNvSpPr/>
+                <p:nvPr/>
+              </p:nvSpPr>
+              <p:spPr>
+                <a:xfrm>
+                  <a:off x="5717969" y="3850518"/>
+                  <a:ext cx="148442" cy="148442"/>
+                </a:xfrm>
+                <a:prstGeom prst="rect">
+                  <a:avLst/>
+                </a:prstGeom>
+                <a:solidFill>
+                  <a:srgbClr val="FF0000"/>
+                </a:solidFill>
+                <a:ln w="28575">
+                  <a:solidFill>
+                    <a:schemeClr val="tx1">
+                      <a:lumMod val="85000"/>
+                      <a:lumOff val="15000"/>
+                    </a:schemeClr>
+                  </a:solidFill>
+                </a:ln>
+              </p:spPr>
+              <p:style>
+                <a:lnRef idx="2">
+                  <a:schemeClr val="accent1">
+                    <a:shade val="50000"/>
+                  </a:schemeClr>
+                </a:lnRef>
+                <a:fillRef idx="1">
+                  <a:schemeClr val="accent1"/>
+                </a:fillRef>
+                <a:effectRef idx="0">
+                  <a:schemeClr val="accent1"/>
+                </a:effectRef>
+                <a:fontRef idx="minor">
+                  <a:schemeClr val="lt1"/>
+                </a:fontRef>
+              </p:style>
+              <p:txBody>
+                <a:bodyPr rtlCol="0" anchor="ctr"/>
+                <a:lstStyle/>
+                <a:p>
+                  <a:pPr algn="ctr"/>
+                  <a:endParaRPr lang="en-US"/>
+                </a:p>
+              </p:txBody>
+            </p:sp>
+            <p:sp>
+              <p:nvSpPr>
+                <p:cNvPr id="62" name="Rectangle 61">
+                  <a:extLst>
+                    <a:ext uri="{FF2B5EF4-FFF2-40B4-BE49-F238E27FC236}">
+                      <a16:creationId xmlns:a16="http://schemas.microsoft.com/office/drawing/2014/main" id="{6DD40FD7-A537-5BC1-FDB9-5676A34B00DC}"/>
+                    </a:ext>
+                  </a:extLst>
+                </p:cNvPr>
+                <p:cNvSpPr/>
+                <p:nvPr/>
+              </p:nvSpPr>
+              <p:spPr>
+                <a:xfrm>
+                  <a:off x="5717969" y="4001334"/>
+                  <a:ext cx="148442" cy="148442"/>
+                </a:xfrm>
+                <a:prstGeom prst="rect">
+                  <a:avLst/>
+                </a:prstGeom>
+                <a:solidFill>
+                  <a:srgbClr val="00B050"/>
+                </a:solidFill>
+                <a:ln w="28575">
+                  <a:solidFill>
+                    <a:schemeClr val="tx1">
+                      <a:lumMod val="85000"/>
+                      <a:lumOff val="15000"/>
+                    </a:schemeClr>
+                  </a:solidFill>
+                </a:ln>
+              </p:spPr>
+              <p:style>
+                <a:lnRef idx="2">
+                  <a:schemeClr val="accent1">
+                    <a:shade val="50000"/>
+                  </a:schemeClr>
+                </a:lnRef>
+                <a:fillRef idx="1">
+                  <a:schemeClr val="accent1"/>
+                </a:fillRef>
+                <a:effectRef idx="0">
+                  <a:schemeClr val="accent1"/>
+                </a:effectRef>
+                <a:fontRef idx="minor">
+                  <a:schemeClr val="lt1"/>
+                </a:fontRef>
+              </p:style>
+              <p:txBody>
+                <a:bodyPr rtlCol="0" anchor="ctr"/>
+                <a:lstStyle/>
+                <a:p>
+                  <a:pPr algn="ctr"/>
+                  <a:endParaRPr lang="en-US" dirty="0"/>
+                </a:p>
+              </p:txBody>
+            </p:sp>
+            <p:sp>
+              <p:nvSpPr>
+                <p:cNvPr id="63" name="Rectangle 62">
+                  <a:extLst>
+                    <a:ext uri="{FF2B5EF4-FFF2-40B4-BE49-F238E27FC236}">
+                      <a16:creationId xmlns:a16="http://schemas.microsoft.com/office/drawing/2014/main" id="{E319B628-D062-2BEF-9923-D5BE2458097A}"/>
+                    </a:ext>
+                  </a:extLst>
+                </p:cNvPr>
+                <p:cNvSpPr/>
+                <p:nvPr/>
+              </p:nvSpPr>
+              <p:spPr>
+                <a:xfrm>
+                  <a:off x="5717969" y="4147402"/>
+                  <a:ext cx="148442" cy="148442"/>
+                </a:xfrm>
+                <a:prstGeom prst="rect">
+                  <a:avLst/>
+                </a:prstGeom>
+                <a:solidFill>
+                  <a:srgbClr val="7030A0"/>
+                </a:solidFill>
+                <a:ln w="28575">
+                  <a:solidFill>
+                    <a:schemeClr val="tx1">
+                      <a:lumMod val="85000"/>
+                      <a:lumOff val="15000"/>
+                    </a:schemeClr>
+                  </a:solidFill>
+                </a:ln>
+              </p:spPr>
+              <p:style>
+                <a:lnRef idx="2">
+                  <a:schemeClr val="accent1">
+                    <a:shade val="50000"/>
+                  </a:schemeClr>
+                </a:lnRef>
+                <a:fillRef idx="1">
+                  <a:schemeClr val="accent1"/>
+                </a:fillRef>
+                <a:effectRef idx="0">
+                  <a:schemeClr val="accent1"/>
+                </a:effectRef>
+                <a:fontRef idx="minor">
+                  <a:schemeClr val="lt1"/>
+                </a:fontRef>
+              </p:style>
+              <p:txBody>
+                <a:bodyPr rtlCol="0" anchor="ctr"/>
+                <a:lstStyle/>
+                <a:p>
+                  <a:pPr algn="ctr"/>
+                  <a:endParaRPr lang="en-US"/>
+                </a:p>
+              </p:txBody>
+            </p:sp>
+          </p:grpSp>
+          <p:cxnSp>
+            <p:nvCxnSpPr>
+              <p:cNvPr id="64" name="Straight Arrow Connector 63">
+                <a:extLst>
+                  <a:ext uri="{FF2B5EF4-FFF2-40B4-BE49-F238E27FC236}">
+                    <a16:creationId xmlns:a16="http://schemas.microsoft.com/office/drawing/2014/main" id="{BE0B4984-DDBF-F97C-87A9-1D5ADC6FCC63}"/>
+                  </a:ext>
+                </a:extLst>
+              </p:cNvPr>
+              <p:cNvCxnSpPr>
+                <a:cxnSpLocks/>
+                <a:endCxn id="55" idx="1"/>
+              </p:cNvCxnSpPr>
+              <p:nvPr/>
+            </p:nvCxnSpPr>
+            <p:spPr>
+              <a:xfrm>
+                <a:off x="4355828" y="3378531"/>
+                <a:ext cx="516654" cy="0"/>
+              </a:xfrm>
+              <a:prstGeom prst="straightConnector1">
+                <a:avLst/>
+              </a:prstGeom>
+              <a:ln w="28575">
+                <a:solidFill>
+                  <a:schemeClr val="tx1">
+                    <a:lumMod val="85000"/>
+                    <a:lumOff val="15000"/>
+                  </a:schemeClr>
+                </a:solidFill>
+                <a:tailEnd type="triangle"/>
+              </a:ln>
+            </p:spPr>
+            <p:style>
+              <a:lnRef idx="1">
+                <a:schemeClr val="accent1"/>
+              </a:lnRef>
+              <a:fillRef idx="0">
+                <a:schemeClr val="accent1"/>
+              </a:fillRef>
+              <a:effectRef idx="0">
+                <a:schemeClr val="accent1"/>
+              </a:effectRef>
+              <a:fontRef idx="minor">
+                <a:schemeClr val="tx1"/>
+              </a:fontRef>
+            </p:style>
+          </p:cxnSp>
+          <p:cxnSp>
+            <p:nvCxnSpPr>
+              <p:cNvPr id="67" name="Straight Arrow Connector 66">
+                <a:extLst>
+                  <a:ext uri="{FF2B5EF4-FFF2-40B4-BE49-F238E27FC236}">
+                    <a16:creationId xmlns:a16="http://schemas.microsoft.com/office/drawing/2014/main" id="{76869E9D-0354-C06C-C201-E059E46D661B}"/>
+                  </a:ext>
+                </a:extLst>
+              </p:cNvPr>
+              <p:cNvCxnSpPr>
+                <a:cxnSpLocks/>
+                <a:endCxn id="61" idx="1"/>
+              </p:cNvCxnSpPr>
+              <p:nvPr/>
+            </p:nvCxnSpPr>
+            <p:spPr>
+              <a:xfrm>
+                <a:off x="4355828" y="4413412"/>
+                <a:ext cx="516654" cy="0"/>
+              </a:xfrm>
+              <a:prstGeom prst="straightConnector1">
+                <a:avLst/>
+              </a:prstGeom>
+              <a:ln w="28575">
+                <a:solidFill>
+                  <a:schemeClr val="tx1">
+                    <a:lumMod val="85000"/>
+                    <a:lumOff val="15000"/>
+                  </a:schemeClr>
+                </a:solidFill>
+                <a:tailEnd type="triangle"/>
+              </a:ln>
+            </p:spPr>
+            <p:style>
+              <a:lnRef idx="1">
+                <a:schemeClr val="accent1"/>
+              </a:lnRef>
+              <a:fillRef idx="0">
+                <a:schemeClr val="accent1"/>
+              </a:fillRef>
+              <a:effectRef idx="0">
+                <a:schemeClr val="accent1"/>
+              </a:effectRef>
+              <a:fontRef idx="minor">
+                <a:schemeClr val="tx1"/>
+              </a:fontRef>
+            </p:style>
+          </p:cxnSp>
+          <p:sp>
+            <p:nvSpPr>
+              <p:cNvPr id="70" name="TextBox 69">
+                <a:extLst>
+                  <a:ext uri="{FF2B5EF4-FFF2-40B4-BE49-F238E27FC236}">
+                    <a16:creationId xmlns:a16="http://schemas.microsoft.com/office/drawing/2014/main" id="{03663897-050F-1EE4-44A6-E3430995520D}"/>
+                  </a:ext>
+                </a:extLst>
+              </p:cNvPr>
+              <p:cNvSpPr txBox="1"/>
+              <p:nvPr/>
+            </p:nvSpPr>
+            <p:spPr>
+              <a:xfrm>
+                <a:off x="5685787" y="3613787"/>
+                <a:ext cx="1269258" cy="646331"/>
+              </a:xfrm>
+              <a:prstGeom prst="rect">
+                <a:avLst/>
+              </a:prstGeom>
+              <a:noFill/>
+            </p:spPr>
+            <p:txBody>
+              <a:bodyPr wrap="none" rtlCol="0">
+                <a:spAutoFit/>
+              </a:bodyPr>
+              <a:lstStyle/>
+              <a:p>
+                <a:pPr algn="ctr"/>
+                <a:r>
+                  <a:rPr lang="en-US" b="1" dirty="0"/>
+                  <a:t>Contrastive</a:t>
+                </a:r>
+              </a:p>
+              <a:p>
+                <a:pPr algn="ctr"/>
+                <a:r>
+                  <a:rPr lang="en-US" b="1" dirty="0"/>
+                  <a:t>Loss</a:t>
+                </a:r>
+              </a:p>
+            </p:txBody>
+          </p:sp>
+          <p:cxnSp>
+            <p:nvCxnSpPr>
+              <p:cNvPr id="71" name="Straight Arrow Connector 70">
+                <a:extLst>
+                  <a:ext uri="{FF2B5EF4-FFF2-40B4-BE49-F238E27FC236}">
+                    <a16:creationId xmlns:a16="http://schemas.microsoft.com/office/drawing/2014/main" id="{271FF59B-115C-3FC7-0E38-52988F4EEFEA}"/>
+                  </a:ext>
+                </a:extLst>
+              </p:cNvPr>
+              <p:cNvCxnSpPr>
+                <a:cxnSpLocks/>
+                <a:stCxn id="55" idx="3"/>
+              </p:cNvCxnSpPr>
+              <p:nvPr/>
+            </p:nvCxnSpPr>
+            <p:spPr>
+              <a:xfrm>
+                <a:off x="5020924" y="3378531"/>
+                <a:ext cx="664863" cy="317299"/>
+              </a:xfrm>
+              <a:prstGeom prst="straightConnector1">
+                <a:avLst/>
+              </a:prstGeom>
+              <a:ln w="28575">
+                <a:solidFill>
+                  <a:schemeClr val="tx1">
+                    <a:lumMod val="85000"/>
+                    <a:lumOff val="15000"/>
+                  </a:schemeClr>
+                </a:solidFill>
+                <a:tailEnd type="triangle"/>
+              </a:ln>
+            </p:spPr>
+            <p:style>
+              <a:lnRef idx="1">
+                <a:schemeClr val="accent1"/>
+              </a:lnRef>
+              <a:fillRef idx="0">
+                <a:schemeClr val="accent1"/>
+              </a:fillRef>
+              <a:effectRef idx="0">
+                <a:schemeClr val="accent1"/>
+              </a:effectRef>
+              <a:fontRef idx="minor">
+                <a:schemeClr val="tx1"/>
+              </a:fontRef>
+            </p:style>
+          </p:cxnSp>
+          <p:cxnSp>
+            <p:nvCxnSpPr>
+              <p:cNvPr id="74" name="Straight Arrow Connector 73">
+                <a:extLst>
+                  <a:ext uri="{FF2B5EF4-FFF2-40B4-BE49-F238E27FC236}">
+                    <a16:creationId xmlns:a16="http://schemas.microsoft.com/office/drawing/2014/main" id="{4D8096A3-6A34-4241-C004-30F324C3AE85}"/>
+                  </a:ext>
+                </a:extLst>
+              </p:cNvPr>
+              <p:cNvCxnSpPr>
+                <a:cxnSpLocks/>
+                <a:stCxn id="61" idx="3"/>
+              </p:cNvCxnSpPr>
+              <p:nvPr/>
+            </p:nvCxnSpPr>
+            <p:spPr>
+              <a:xfrm flipV="1">
+                <a:off x="5020924" y="4124268"/>
+                <a:ext cx="664863" cy="289144"/>
+              </a:xfrm>
+              <a:prstGeom prst="straightConnector1">
+                <a:avLst/>
+              </a:prstGeom>
+              <a:ln w="28575">
+                <a:solidFill>
+                  <a:schemeClr val="tx1">
+                    <a:lumMod val="85000"/>
+                    <a:lumOff val="15000"/>
+                  </a:schemeClr>
+                </a:solidFill>
+                <a:tailEnd type="triangle"/>
+              </a:ln>
+            </p:spPr>
+            <p:style>
+              <a:lnRef idx="1">
+                <a:schemeClr val="accent1"/>
+              </a:lnRef>
+              <a:fillRef idx="0">
+                <a:schemeClr val="accent1"/>
+              </a:fillRef>
+              <a:effectRef idx="0">
+                <a:schemeClr val="accent1"/>
+              </a:effectRef>
+              <a:fontRef idx="minor">
+                <a:schemeClr val="tx1"/>
+              </a:fontRef>
+            </p:style>
+          </p:cxnSp>
+        </p:grpSp>
+        <p:grpSp>
+          <p:nvGrpSpPr>
+            <p:cNvPr id="129" name="Group 128">
+              <a:extLst>
+                <a:ext uri="{FF2B5EF4-FFF2-40B4-BE49-F238E27FC236}">
+                  <a16:creationId xmlns:a16="http://schemas.microsoft.com/office/drawing/2014/main" id="{9B49D06A-EB09-5DE1-572D-F0920D3DC869}"/>
+                </a:ext>
+              </a:extLst>
+            </p:cNvPr>
+            <p:cNvGrpSpPr/>
+            <p:nvPr/>
+          </p:nvGrpSpPr>
+          <p:grpSpPr>
+            <a:xfrm>
+              <a:off x="3801100" y="3932378"/>
+              <a:ext cx="5076984" cy="2284451"/>
+              <a:chOff x="3801100" y="3074186"/>
+              <a:chExt cx="5076984" cy="2284451"/>
+            </a:xfrm>
+          </p:grpSpPr>
+          <p:sp>
+            <p:nvSpPr>
+              <p:cNvPr id="82" name="Rounded Rectangle 81">
+                <a:extLst>
+                  <a:ext uri="{FF2B5EF4-FFF2-40B4-BE49-F238E27FC236}">
+                    <a16:creationId xmlns:a16="http://schemas.microsoft.com/office/drawing/2014/main" id="{54F814BE-30E7-A76E-D747-C3C8A3F6093C}"/>
+                  </a:ext>
+                </a:extLst>
+              </p:cNvPr>
+              <p:cNvSpPr/>
+              <p:nvPr/>
+            </p:nvSpPr>
+            <p:spPr>
+              <a:xfrm rot="5400000">
+                <a:off x="4562511" y="3655536"/>
+                <a:ext cx="1827561" cy="664862"/>
+              </a:xfrm>
+              <a:prstGeom prst="roundRect">
+                <a:avLst/>
+              </a:prstGeom>
+              <a:solidFill>
+                <a:srgbClr val="0070C0"/>
+              </a:solidFill>
+              <a:ln w="28575">
+                <a:solidFill>
+                  <a:schemeClr val="tx1">
+                    <a:lumMod val="85000"/>
+                    <a:lumOff val="15000"/>
+                  </a:schemeClr>
+                </a:solidFill>
+              </a:ln>
+            </p:spPr>
+            <p:style>
+              <a:lnRef idx="2">
+                <a:schemeClr val="accent1">
+                  <a:shade val="50000"/>
+                </a:schemeClr>
+              </a:lnRef>
+              <a:fillRef idx="1">
+                <a:schemeClr val="accent1"/>
+              </a:fillRef>
+              <a:effectRef idx="0">
+                <a:schemeClr val="accent1"/>
+              </a:effectRef>
+              <a:fontRef idx="minor">
+                <a:schemeClr val="lt1"/>
+              </a:fontRef>
+            </p:style>
+            <p:txBody>
+              <a:bodyPr rtlCol="0" anchor="ctr"/>
+              <a:lstStyle/>
+              <a:p>
+                <a:pPr algn="ctr"/>
+                <a:r>
+                  <a:rPr lang="en-US" dirty="0"/>
+                  <a:t>Neural Network</a:t>
+                </a:r>
+              </a:p>
+            </p:txBody>
+          </p:sp>
+          <p:sp>
+            <p:nvSpPr>
+              <p:cNvPr id="89" name="Trapezoid 88">
+                <a:extLst>
+                  <a:ext uri="{FF2B5EF4-FFF2-40B4-BE49-F238E27FC236}">
+                    <a16:creationId xmlns:a16="http://schemas.microsoft.com/office/drawing/2014/main" id="{DDA2A239-98AE-E5AA-5B75-B7850B7D1DEA}"/>
+                  </a:ext>
+                </a:extLst>
+              </p:cNvPr>
+              <p:cNvSpPr/>
+              <p:nvPr/>
+            </p:nvSpPr>
+            <p:spPr>
+              <a:xfrm rot="5400000">
+                <a:off x="6547360" y="3865533"/>
+                <a:ext cx="742210" cy="234536"/>
+              </a:xfrm>
+              <a:prstGeom prst="trapezoid">
+                <a:avLst>
+                  <a:gd name="adj" fmla="val 52143"/>
+                </a:avLst>
+              </a:prstGeom>
+              <a:solidFill>
+                <a:srgbClr val="00B050"/>
+              </a:solidFill>
+              <a:ln w="28575">
+                <a:solidFill>
+                  <a:schemeClr val="tx1">
+                    <a:lumMod val="85000"/>
+                    <a:lumOff val="15000"/>
+                  </a:schemeClr>
+                </a:solidFill>
+              </a:ln>
+            </p:spPr>
+            <p:style>
+              <a:lnRef idx="2">
+                <a:schemeClr val="accent1">
+                  <a:shade val="50000"/>
+                </a:schemeClr>
+              </a:lnRef>
+              <a:fillRef idx="1">
+                <a:schemeClr val="accent1"/>
+              </a:fillRef>
+              <a:effectRef idx="0">
+                <a:schemeClr val="accent1"/>
+              </a:effectRef>
+              <a:fontRef idx="minor">
+                <a:schemeClr val="lt1"/>
+              </a:fontRef>
+            </p:style>
+            <p:txBody>
+              <a:bodyPr rtlCol="0" anchor="ctr"/>
+              <a:lstStyle/>
+              <a:p>
+                <a:pPr algn="ctr"/>
+                <a:r>
+                  <a:rPr lang="en-US" sz="1400" dirty="0"/>
+                  <a:t>FC</a:t>
+                </a:r>
+              </a:p>
+            </p:txBody>
+          </p:sp>
+          <p:grpSp>
+            <p:nvGrpSpPr>
+              <p:cNvPr id="90" name="Group 89">
+                <a:extLst>
+                  <a:ext uri="{FF2B5EF4-FFF2-40B4-BE49-F238E27FC236}">
+                    <a16:creationId xmlns:a16="http://schemas.microsoft.com/office/drawing/2014/main" id="{706CD846-E11B-6E7E-657B-D20F62ADEFC5}"/>
+                  </a:ext>
+                </a:extLst>
+              </p:cNvPr>
+              <p:cNvGrpSpPr/>
+              <p:nvPr/>
+            </p:nvGrpSpPr>
+            <p:grpSpPr>
+              <a:xfrm>
+                <a:off x="6324699" y="3611696"/>
+                <a:ext cx="148442" cy="742210"/>
+                <a:chOff x="5717969" y="3553634"/>
+                <a:chExt cx="148442" cy="742210"/>
+              </a:xfrm>
+            </p:grpSpPr>
+            <p:sp>
+              <p:nvSpPr>
+                <p:cNvPr id="91" name="Rectangle 90">
+                  <a:extLst>
+                    <a:ext uri="{FF2B5EF4-FFF2-40B4-BE49-F238E27FC236}">
+                      <a16:creationId xmlns:a16="http://schemas.microsoft.com/office/drawing/2014/main" id="{70D950CB-13BC-54C2-700B-08BBADBC45D5}"/>
+                    </a:ext>
+                  </a:extLst>
+                </p:cNvPr>
+                <p:cNvSpPr/>
+                <p:nvPr/>
+              </p:nvSpPr>
+              <p:spPr>
+                <a:xfrm>
+                  <a:off x="5717969" y="3553634"/>
+                  <a:ext cx="148442" cy="148442"/>
+                </a:xfrm>
+                <a:prstGeom prst="rect">
+                  <a:avLst/>
+                </a:prstGeom>
+                <a:solidFill>
+                  <a:schemeClr val="accent2"/>
+                </a:solidFill>
+                <a:ln w="28575">
+                  <a:solidFill>
+                    <a:schemeClr val="tx1">
+                      <a:lumMod val="85000"/>
+                      <a:lumOff val="15000"/>
+                    </a:schemeClr>
+                  </a:solidFill>
+                </a:ln>
+              </p:spPr>
+              <p:style>
+                <a:lnRef idx="2">
+                  <a:schemeClr val="accent1">
+                    <a:shade val="50000"/>
+                  </a:schemeClr>
+                </a:lnRef>
+                <a:fillRef idx="1">
+                  <a:schemeClr val="accent1"/>
+                </a:fillRef>
+                <a:effectRef idx="0">
+                  <a:schemeClr val="accent1"/>
+                </a:effectRef>
+                <a:fontRef idx="minor">
+                  <a:schemeClr val="lt1"/>
+                </a:fontRef>
+              </p:style>
+              <p:txBody>
+                <a:bodyPr rtlCol="0" anchor="ctr"/>
+                <a:lstStyle/>
+                <a:p>
+                  <a:pPr algn="ctr"/>
+                  <a:endParaRPr lang="en-US"/>
+                </a:p>
+              </p:txBody>
+            </p:sp>
+            <p:sp>
+              <p:nvSpPr>
+                <p:cNvPr id="92" name="Rectangle 91">
+                  <a:extLst>
+                    <a:ext uri="{FF2B5EF4-FFF2-40B4-BE49-F238E27FC236}">
+                      <a16:creationId xmlns:a16="http://schemas.microsoft.com/office/drawing/2014/main" id="{B436F055-8BD4-F141-61D2-BEEFFB789848}"/>
+                    </a:ext>
+                  </a:extLst>
+                </p:cNvPr>
+                <p:cNvSpPr/>
+                <p:nvPr/>
+              </p:nvSpPr>
+              <p:spPr>
+                <a:xfrm>
+                  <a:off x="5717969" y="3702076"/>
+                  <a:ext cx="148442" cy="148442"/>
+                </a:xfrm>
+                <a:prstGeom prst="rect">
+                  <a:avLst/>
+                </a:prstGeom>
+                <a:solidFill>
+                  <a:srgbClr val="0070C0"/>
+                </a:solidFill>
+                <a:ln w="28575">
+                  <a:solidFill>
+                    <a:schemeClr val="tx1">
+                      <a:lumMod val="85000"/>
+                      <a:lumOff val="15000"/>
+                    </a:schemeClr>
+                  </a:solidFill>
+                </a:ln>
+              </p:spPr>
+              <p:style>
+                <a:lnRef idx="2">
+                  <a:schemeClr val="accent1">
+                    <a:shade val="50000"/>
+                  </a:schemeClr>
+                </a:lnRef>
+                <a:fillRef idx="1">
+                  <a:schemeClr val="accent1"/>
+                </a:fillRef>
+                <a:effectRef idx="0">
+                  <a:schemeClr val="accent1"/>
+                </a:effectRef>
+                <a:fontRef idx="minor">
+                  <a:schemeClr val="lt1"/>
+                </a:fontRef>
+              </p:style>
+              <p:txBody>
+                <a:bodyPr rtlCol="0" anchor="ctr"/>
+                <a:lstStyle/>
+                <a:p>
+                  <a:pPr algn="ctr"/>
+                  <a:endParaRPr lang="en-US"/>
+                </a:p>
+              </p:txBody>
+            </p:sp>
+            <p:sp>
+              <p:nvSpPr>
+                <p:cNvPr id="93" name="Rectangle 92">
+                  <a:extLst>
+                    <a:ext uri="{FF2B5EF4-FFF2-40B4-BE49-F238E27FC236}">
+                      <a16:creationId xmlns:a16="http://schemas.microsoft.com/office/drawing/2014/main" id="{7914888B-ABF6-F4E7-2128-0028D7A636AD}"/>
+                    </a:ext>
+                  </a:extLst>
+                </p:cNvPr>
+                <p:cNvSpPr/>
+                <p:nvPr/>
+              </p:nvSpPr>
+              <p:spPr>
+                <a:xfrm>
+                  <a:off x="5717969" y="3850518"/>
+                  <a:ext cx="148442" cy="148442"/>
+                </a:xfrm>
+                <a:prstGeom prst="rect">
+                  <a:avLst/>
+                </a:prstGeom>
+                <a:solidFill>
+                  <a:srgbClr val="FF0000"/>
+                </a:solidFill>
+                <a:ln w="28575">
+                  <a:solidFill>
+                    <a:schemeClr val="tx1">
+                      <a:lumMod val="85000"/>
+                      <a:lumOff val="15000"/>
+                    </a:schemeClr>
+                  </a:solidFill>
+                </a:ln>
+              </p:spPr>
+              <p:style>
+                <a:lnRef idx="2">
+                  <a:schemeClr val="accent1">
+                    <a:shade val="50000"/>
+                  </a:schemeClr>
+                </a:lnRef>
+                <a:fillRef idx="1">
+                  <a:schemeClr val="accent1"/>
+                </a:fillRef>
+                <a:effectRef idx="0">
+                  <a:schemeClr val="accent1"/>
+                </a:effectRef>
+                <a:fontRef idx="minor">
+                  <a:schemeClr val="lt1"/>
+                </a:fontRef>
+              </p:style>
+              <p:txBody>
+                <a:bodyPr rtlCol="0" anchor="ctr"/>
+                <a:lstStyle/>
+                <a:p>
+                  <a:pPr algn="ctr"/>
+                  <a:endParaRPr lang="en-US"/>
+                </a:p>
+              </p:txBody>
+            </p:sp>
+            <p:sp>
+              <p:nvSpPr>
+                <p:cNvPr id="94" name="Rectangle 93">
+                  <a:extLst>
+                    <a:ext uri="{FF2B5EF4-FFF2-40B4-BE49-F238E27FC236}">
+                      <a16:creationId xmlns:a16="http://schemas.microsoft.com/office/drawing/2014/main" id="{0434E020-7D3F-4213-FF34-BD4D90E19DF0}"/>
+                    </a:ext>
+                  </a:extLst>
+                </p:cNvPr>
+                <p:cNvSpPr/>
+                <p:nvPr/>
+              </p:nvSpPr>
+              <p:spPr>
+                <a:xfrm>
+                  <a:off x="5717969" y="4001334"/>
+                  <a:ext cx="148442" cy="148442"/>
+                </a:xfrm>
+                <a:prstGeom prst="rect">
+                  <a:avLst/>
+                </a:prstGeom>
+                <a:solidFill>
+                  <a:srgbClr val="00B050"/>
+                </a:solidFill>
+                <a:ln w="28575">
+                  <a:solidFill>
+                    <a:schemeClr val="tx1">
+                      <a:lumMod val="85000"/>
+                      <a:lumOff val="15000"/>
+                    </a:schemeClr>
+                  </a:solidFill>
+                </a:ln>
+              </p:spPr>
+              <p:style>
+                <a:lnRef idx="2">
+                  <a:schemeClr val="accent1">
+                    <a:shade val="50000"/>
+                  </a:schemeClr>
+                </a:lnRef>
+                <a:fillRef idx="1">
+                  <a:schemeClr val="accent1"/>
+                </a:fillRef>
+                <a:effectRef idx="0">
+                  <a:schemeClr val="accent1"/>
+                </a:effectRef>
+                <a:fontRef idx="minor">
+                  <a:schemeClr val="lt1"/>
+                </a:fontRef>
+              </p:style>
+              <p:txBody>
+                <a:bodyPr rtlCol="0" anchor="ctr"/>
+                <a:lstStyle/>
+                <a:p>
+                  <a:pPr algn="ctr"/>
+                  <a:endParaRPr lang="en-US" dirty="0"/>
+                </a:p>
+              </p:txBody>
+            </p:sp>
+            <p:sp>
+              <p:nvSpPr>
+                <p:cNvPr id="95" name="Rectangle 94">
+                  <a:extLst>
+                    <a:ext uri="{FF2B5EF4-FFF2-40B4-BE49-F238E27FC236}">
+                      <a16:creationId xmlns:a16="http://schemas.microsoft.com/office/drawing/2014/main" id="{6CEB0AFA-7456-096F-E493-8FFD070F2FA6}"/>
+                    </a:ext>
+                  </a:extLst>
+                </p:cNvPr>
+                <p:cNvSpPr/>
+                <p:nvPr/>
+              </p:nvSpPr>
+              <p:spPr>
+                <a:xfrm>
+                  <a:off x="5717969" y="4147402"/>
+                  <a:ext cx="148442" cy="148442"/>
+                </a:xfrm>
+                <a:prstGeom prst="rect">
+                  <a:avLst/>
+                </a:prstGeom>
+                <a:solidFill>
+                  <a:srgbClr val="7030A0"/>
+                </a:solidFill>
+                <a:ln w="28575">
+                  <a:solidFill>
+                    <a:schemeClr val="tx1">
+                      <a:lumMod val="85000"/>
+                      <a:lumOff val="15000"/>
+                    </a:schemeClr>
+                  </a:solidFill>
+                </a:ln>
+              </p:spPr>
+              <p:style>
+                <a:lnRef idx="2">
+                  <a:schemeClr val="accent1">
+                    <a:shade val="50000"/>
+                  </a:schemeClr>
+                </a:lnRef>
+                <a:fillRef idx="1">
+                  <a:schemeClr val="accent1"/>
+                </a:fillRef>
+                <a:effectRef idx="0">
+                  <a:schemeClr val="accent1"/>
+                </a:effectRef>
+                <a:fontRef idx="minor">
+                  <a:schemeClr val="lt1"/>
+                </a:fontRef>
+              </p:style>
+              <p:txBody>
+                <a:bodyPr rtlCol="0" anchor="ctr"/>
+                <a:lstStyle/>
+                <a:p>
+                  <a:pPr algn="ctr"/>
+                  <a:endParaRPr lang="en-US"/>
+                </a:p>
+              </p:txBody>
+            </p:sp>
+          </p:grpSp>
+          <p:cxnSp>
+            <p:nvCxnSpPr>
+              <p:cNvPr id="96" name="Straight Arrow Connector 95">
+                <a:extLst>
+                  <a:ext uri="{FF2B5EF4-FFF2-40B4-BE49-F238E27FC236}">
+                    <a16:creationId xmlns:a16="http://schemas.microsoft.com/office/drawing/2014/main" id="{5B7111F8-E828-49B6-A143-FDD42B0E9482}"/>
+                  </a:ext>
+                </a:extLst>
+              </p:cNvPr>
+              <p:cNvCxnSpPr>
+                <a:cxnSpLocks/>
+                <a:stCxn id="93" idx="3"/>
+                <a:endCxn id="89" idx="2"/>
+              </p:cNvCxnSpPr>
+              <p:nvPr/>
+            </p:nvCxnSpPr>
+            <p:spPr>
+              <a:xfrm>
+                <a:off x="6473141" y="3982801"/>
+                <a:ext cx="328056" cy="0"/>
+              </a:xfrm>
+              <a:prstGeom prst="straightConnector1">
+                <a:avLst/>
+              </a:prstGeom>
+              <a:ln w="28575">
+                <a:solidFill>
+                  <a:schemeClr val="tx1">
+                    <a:lumMod val="85000"/>
+                    <a:lumOff val="15000"/>
+                  </a:schemeClr>
+                </a:solidFill>
+                <a:tailEnd type="triangle"/>
+              </a:ln>
+            </p:spPr>
+            <p:style>
+              <a:lnRef idx="1">
+                <a:schemeClr val="accent1"/>
+              </a:lnRef>
+              <a:fillRef idx="0">
+                <a:schemeClr val="accent1"/>
+              </a:fillRef>
+              <a:effectRef idx="0">
+                <a:schemeClr val="accent1"/>
+              </a:effectRef>
+              <a:fontRef idx="minor">
+                <a:schemeClr val="tx1"/>
+              </a:fontRef>
+            </p:style>
+          </p:cxnSp>
+          <p:grpSp>
+            <p:nvGrpSpPr>
+              <p:cNvPr id="97" name="Group 96">
+                <a:extLst>
+                  <a:ext uri="{FF2B5EF4-FFF2-40B4-BE49-F238E27FC236}">
+                    <a16:creationId xmlns:a16="http://schemas.microsoft.com/office/drawing/2014/main" id="{930B8660-C618-C86D-0F5F-33A2E9844BA3}"/>
+                  </a:ext>
+                </a:extLst>
+              </p:cNvPr>
+              <p:cNvGrpSpPr/>
+              <p:nvPr/>
+            </p:nvGrpSpPr>
+            <p:grpSpPr>
+              <a:xfrm>
+                <a:off x="7363789" y="3760138"/>
+                <a:ext cx="148442" cy="447700"/>
+                <a:chOff x="5717969" y="3702076"/>
+                <a:chExt cx="148442" cy="447700"/>
+              </a:xfrm>
+            </p:grpSpPr>
+            <p:sp>
+              <p:nvSpPr>
+                <p:cNvPr id="98" name="Rectangle 97">
+                  <a:extLst>
+                    <a:ext uri="{FF2B5EF4-FFF2-40B4-BE49-F238E27FC236}">
+                      <a16:creationId xmlns:a16="http://schemas.microsoft.com/office/drawing/2014/main" id="{1CA6DC50-D0EB-1934-8F44-6F99F60F93A6}"/>
+                    </a:ext>
+                  </a:extLst>
+                </p:cNvPr>
+                <p:cNvSpPr/>
+                <p:nvPr/>
+              </p:nvSpPr>
+              <p:spPr>
+                <a:xfrm>
+                  <a:off x="5717969" y="3702076"/>
+                  <a:ext cx="148442" cy="148442"/>
+                </a:xfrm>
+                <a:prstGeom prst="rect">
+                  <a:avLst/>
+                </a:prstGeom>
+                <a:solidFill>
+                  <a:srgbClr val="0070C0"/>
+                </a:solidFill>
+                <a:ln w="28575">
+                  <a:solidFill>
+                    <a:schemeClr val="tx1">
+                      <a:lumMod val="85000"/>
+                      <a:lumOff val="15000"/>
+                    </a:schemeClr>
+                  </a:solidFill>
+                </a:ln>
+              </p:spPr>
+              <p:style>
+                <a:lnRef idx="2">
+                  <a:schemeClr val="accent1">
+                    <a:shade val="50000"/>
+                  </a:schemeClr>
+                </a:lnRef>
+                <a:fillRef idx="1">
+                  <a:schemeClr val="accent1"/>
+                </a:fillRef>
+                <a:effectRef idx="0">
+                  <a:schemeClr val="accent1"/>
+                </a:effectRef>
+                <a:fontRef idx="minor">
+                  <a:schemeClr val="lt1"/>
+                </a:fontRef>
+              </p:style>
+              <p:txBody>
+                <a:bodyPr rtlCol="0" anchor="ctr"/>
+                <a:lstStyle/>
+                <a:p>
+                  <a:pPr algn="ctr"/>
+                  <a:endParaRPr lang="en-US"/>
+                </a:p>
+              </p:txBody>
+            </p:sp>
+            <p:sp>
+              <p:nvSpPr>
+                <p:cNvPr id="99" name="Rectangle 98">
+                  <a:extLst>
+                    <a:ext uri="{FF2B5EF4-FFF2-40B4-BE49-F238E27FC236}">
+                      <a16:creationId xmlns:a16="http://schemas.microsoft.com/office/drawing/2014/main" id="{28A21995-38D2-C2E7-649D-3EAB3EA23A81}"/>
+                    </a:ext>
+                  </a:extLst>
+                </p:cNvPr>
+                <p:cNvSpPr/>
+                <p:nvPr/>
+              </p:nvSpPr>
+              <p:spPr>
+                <a:xfrm>
+                  <a:off x="5717969" y="3850518"/>
+                  <a:ext cx="148442" cy="148442"/>
+                </a:xfrm>
+                <a:prstGeom prst="rect">
+                  <a:avLst/>
+                </a:prstGeom>
+                <a:solidFill>
+                  <a:srgbClr val="FF0000"/>
+                </a:solidFill>
+                <a:ln w="28575">
+                  <a:solidFill>
+                    <a:schemeClr val="tx1">
+                      <a:lumMod val="85000"/>
+                      <a:lumOff val="15000"/>
+                    </a:schemeClr>
+                  </a:solidFill>
+                </a:ln>
+              </p:spPr>
+              <p:style>
+                <a:lnRef idx="2">
+                  <a:schemeClr val="accent1">
+                    <a:shade val="50000"/>
+                  </a:schemeClr>
+                </a:lnRef>
+                <a:fillRef idx="1">
+                  <a:schemeClr val="accent1"/>
+                </a:fillRef>
+                <a:effectRef idx="0">
+                  <a:schemeClr val="accent1"/>
+                </a:effectRef>
+                <a:fontRef idx="minor">
+                  <a:schemeClr val="lt1"/>
+                </a:fontRef>
+              </p:style>
+              <p:txBody>
+                <a:bodyPr rtlCol="0" anchor="ctr"/>
+                <a:lstStyle/>
+                <a:p>
+                  <a:pPr algn="ctr"/>
+                  <a:endParaRPr lang="en-US"/>
+                </a:p>
+              </p:txBody>
+            </p:sp>
+            <p:sp>
+              <p:nvSpPr>
+                <p:cNvPr id="100" name="Rectangle 99">
+                  <a:extLst>
+                    <a:ext uri="{FF2B5EF4-FFF2-40B4-BE49-F238E27FC236}">
+                      <a16:creationId xmlns:a16="http://schemas.microsoft.com/office/drawing/2014/main" id="{D7D91DD3-A8AC-A2CF-7E28-95935DD7FF9A}"/>
+                    </a:ext>
+                  </a:extLst>
+                </p:cNvPr>
+                <p:cNvSpPr/>
+                <p:nvPr/>
+              </p:nvSpPr>
+              <p:spPr>
+                <a:xfrm>
+                  <a:off x="5717969" y="4001334"/>
+                  <a:ext cx="148442" cy="148442"/>
+                </a:xfrm>
+                <a:prstGeom prst="rect">
+                  <a:avLst/>
+                </a:prstGeom>
+                <a:solidFill>
+                  <a:srgbClr val="00B050"/>
+                </a:solidFill>
+                <a:ln w="28575">
+                  <a:solidFill>
+                    <a:schemeClr val="tx1">
+                      <a:lumMod val="85000"/>
+                      <a:lumOff val="15000"/>
+                    </a:schemeClr>
+                  </a:solidFill>
+                </a:ln>
+              </p:spPr>
+              <p:style>
+                <a:lnRef idx="2">
+                  <a:schemeClr val="accent1">
+                    <a:shade val="50000"/>
+                  </a:schemeClr>
+                </a:lnRef>
+                <a:fillRef idx="1">
+                  <a:schemeClr val="accent1"/>
+                </a:fillRef>
+                <a:effectRef idx="0">
+                  <a:schemeClr val="accent1"/>
+                </a:effectRef>
+                <a:fontRef idx="minor">
+                  <a:schemeClr val="lt1"/>
+                </a:fontRef>
+              </p:style>
+              <p:txBody>
+                <a:bodyPr rtlCol="0" anchor="ctr"/>
+                <a:lstStyle/>
+                <a:p>
+                  <a:pPr algn="ctr"/>
+                  <a:endParaRPr lang="en-US" dirty="0"/>
+                </a:p>
+              </p:txBody>
+            </p:sp>
+          </p:grpSp>
+          <p:cxnSp>
+            <p:nvCxnSpPr>
+              <p:cNvPr id="101" name="Straight Arrow Connector 100">
+                <a:extLst>
+                  <a:ext uri="{FF2B5EF4-FFF2-40B4-BE49-F238E27FC236}">
+                    <a16:creationId xmlns:a16="http://schemas.microsoft.com/office/drawing/2014/main" id="{A83BF8E6-9D10-3174-85E1-EFCE703E444B}"/>
+                  </a:ext>
+                </a:extLst>
+              </p:cNvPr>
+              <p:cNvCxnSpPr>
+                <a:cxnSpLocks/>
+                <a:stCxn id="89" idx="0"/>
+                <a:endCxn id="99" idx="1"/>
+              </p:cNvCxnSpPr>
+              <p:nvPr/>
+            </p:nvCxnSpPr>
+            <p:spPr>
+              <a:xfrm>
+                <a:off x="7035733" y="3982801"/>
+                <a:ext cx="328056" cy="0"/>
+              </a:xfrm>
+              <a:prstGeom prst="straightConnector1">
+                <a:avLst/>
+              </a:prstGeom>
+              <a:ln w="28575">
+                <a:solidFill>
+                  <a:schemeClr val="tx1">
+                    <a:lumMod val="85000"/>
+                    <a:lumOff val="15000"/>
+                  </a:schemeClr>
+                </a:solidFill>
+                <a:tailEnd type="triangle"/>
+              </a:ln>
+            </p:spPr>
+            <p:style>
+              <a:lnRef idx="1">
+                <a:schemeClr val="accent1"/>
+              </a:lnRef>
+              <a:fillRef idx="0">
+                <a:schemeClr val="accent1"/>
+              </a:fillRef>
+              <a:effectRef idx="0">
+                <a:schemeClr val="accent1"/>
+              </a:effectRef>
+              <a:fontRef idx="minor">
+                <a:schemeClr val="tx1"/>
+              </a:fontRef>
+            </p:style>
+          </p:cxnSp>
+          <p:sp>
+            <p:nvSpPr>
+              <p:cNvPr id="102" name="Rounded Rectangle 101">
+                <a:extLst>
+                  <a:ext uri="{FF2B5EF4-FFF2-40B4-BE49-F238E27FC236}">
+                    <a16:creationId xmlns:a16="http://schemas.microsoft.com/office/drawing/2014/main" id="{5CB8AE13-02A6-AB38-9F3E-64D107C13A28}"/>
+                  </a:ext>
+                </a:extLst>
+              </p:cNvPr>
+              <p:cNvSpPr/>
+              <p:nvPr/>
+            </p:nvSpPr>
+            <p:spPr>
+              <a:xfrm rot="5400000">
+                <a:off x="7490706" y="3865533"/>
+                <a:ext cx="933698" cy="234536"/>
+              </a:xfrm>
+              <a:prstGeom prst="roundRect">
+                <a:avLst>
+                  <a:gd name="adj" fmla="val 50000"/>
+                </a:avLst>
+              </a:prstGeom>
+              <a:solidFill>
+                <a:srgbClr val="FFC000"/>
+              </a:solidFill>
+              <a:ln w="28575">
+                <a:solidFill>
+                  <a:schemeClr val="bg2">
+                    <a:lumMod val="25000"/>
+                  </a:schemeClr>
+                </a:solidFill>
+              </a:ln>
+            </p:spPr>
+            <p:style>
+              <a:lnRef idx="2">
+                <a:schemeClr val="accent1">
+                  <a:shade val="50000"/>
+                </a:schemeClr>
+              </a:lnRef>
+              <a:fillRef idx="1">
+                <a:schemeClr val="accent1"/>
+              </a:fillRef>
+              <a:effectRef idx="0">
+                <a:schemeClr val="accent1"/>
+              </a:effectRef>
+              <a:fontRef idx="minor">
+                <a:schemeClr val="lt1"/>
+              </a:fontRef>
+            </p:style>
+            <p:txBody>
+              <a:bodyPr rtlCol="0" anchor="ctr"/>
+              <a:lstStyle/>
+              <a:p>
+                <a:pPr algn="ctr"/>
+                <a:r>
+                  <a:rPr lang="en-US" sz="1400" dirty="0"/>
+                  <a:t>Softmax</a:t>
+                </a:r>
+              </a:p>
+            </p:txBody>
+          </p:sp>
+          <p:cxnSp>
+            <p:nvCxnSpPr>
+              <p:cNvPr id="103" name="Straight Arrow Connector 102">
+                <a:extLst>
+                  <a:ext uri="{FF2B5EF4-FFF2-40B4-BE49-F238E27FC236}">
+                    <a16:creationId xmlns:a16="http://schemas.microsoft.com/office/drawing/2014/main" id="{9EB58275-5082-D86E-7D0E-29A93AC8676E}"/>
+                  </a:ext>
+                </a:extLst>
+              </p:cNvPr>
+              <p:cNvCxnSpPr>
+                <a:cxnSpLocks/>
+                <a:stCxn id="99" idx="3"/>
+                <a:endCxn id="102" idx="2"/>
+              </p:cNvCxnSpPr>
+              <p:nvPr/>
+            </p:nvCxnSpPr>
+            <p:spPr>
+              <a:xfrm>
+                <a:off x="7512231" y="3982801"/>
+                <a:ext cx="328056" cy="0"/>
+              </a:xfrm>
+              <a:prstGeom prst="straightConnector1">
+                <a:avLst/>
+              </a:prstGeom>
+              <a:ln w="28575">
+                <a:solidFill>
+                  <a:schemeClr val="tx1">
+                    <a:lumMod val="85000"/>
+                    <a:lumOff val="15000"/>
+                  </a:schemeClr>
+                </a:solidFill>
+                <a:tailEnd type="triangle"/>
+              </a:ln>
+            </p:spPr>
+            <p:style>
+              <a:lnRef idx="1">
+                <a:schemeClr val="accent1"/>
+              </a:lnRef>
+              <a:fillRef idx="0">
+                <a:schemeClr val="accent1"/>
+              </a:fillRef>
+              <a:effectRef idx="0">
+                <a:schemeClr val="accent1"/>
+              </a:effectRef>
+              <a:fontRef idx="minor">
+                <a:schemeClr val="tx1"/>
+              </a:fontRef>
+            </p:style>
+          </p:cxnSp>
+          <p:sp>
+            <p:nvSpPr>
+              <p:cNvPr id="104" name="TextBox 103">
+                <a:extLst>
+                  <a:ext uri="{FF2B5EF4-FFF2-40B4-BE49-F238E27FC236}">
+                    <a16:creationId xmlns:a16="http://schemas.microsoft.com/office/drawing/2014/main" id="{978E42F7-8AD7-8BD1-8EE9-C7290AC018D2}"/>
+                  </a:ext>
+                </a:extLst>
+              </p:cNvPr>
+              <p:cNvSpPr txBox="1"/>
+              <p:nvPr/>
+            </p:nvSpPr>
+            <p:spPr>
+              <a:xfrm>
+                <a:off x="8390899" y="3798135"/>
+                <a:ext cx="487185" cy="369332"/>
+              </a:xfrm>
+              <a:prstGeom prst="rect">
+                <a:avLst/>
+              </a:prstGeom>
+              <a:noFill/>
+            </p:spPr>
+            <p:txBody>
+              <a:bodyPr wrap="none" rtlCol="0">
+                <a:spAutoFit/>
+              </a:bodyPr>
+              <a:lstStyle/>
+              <a:p>
+                <a:pPr algn="ctr"/>
+                <a:r>
+                  <a:rPr lang="en-US" b="1" dirty="0"/>
+                  <a:t>LTS</a:t>
+                </a:r>
+              </a:p>
+            </p:txBody>
+          </p:sp>
+          <p:cxnSp>
+            <p:nvCxnSpPr>
+              <p:cNvPr id="105" name="Straight Arrow Connector 104">
+                <a:extLst>
+                  <a:ext uri="{FF2B5EF4-FFF2-40B4-BE49-F238E27FC236}">
+                    <a16:creationId xmlns:a16="http://schemas.microsoft.com/office/drawing/2014/main" id="{912F802E-9F5D-C60B-7586-B36211309D96}"/>
+                  </a:ext>
+                </a:extLst>
+              </p:cNvPr>
+              <p:cNvCxnSpPr>
+                <a:cxnSpLocks/>
+                <a:stCxn id="102" idx="0"/>
+                <a:endCxn id="104" idx="1"/>
+              </p:cNvCxnSpPr>
+              <p:nvPr/>
+            </p:nvCxnSpPr>
+            <p:spPr>
+              <a:xfrm>
+                <a:off x="8074823" y="3982801"/>
+                <a:ext cx="316076" cy="0"/>
+              </a:xfrm>
+              <a:prstGeom prst="straightConnector1">
+                <a:avLst/>
+              </a:prstGeom>
+              <a:ln w="28575">
+                <a:solidFill>
+                  <a:schemeClr val="tx1">
+                    <a:lumMod val="85000"/>
+                    <a:lumOff val="15000"/>
+                  </a:schemeClr>
+                </a:solidFill>
+                <a:tailEnd type="triangle"/>
+              </a:ln>
+            </p:spPr>
+            <p:style>
+              <a:lnRef idx="1">
+                <a:schemeClr val="accent1"/>
+              </a:lnRef>
+              <a:fillRef idx="0">
+                <a:schemeClr val="accent1"/>
+              </a:fillRef>
+              <a:effectRef idx="0">
+                <a:schemeClr val="accent1"/>
+              </a:effectRef>
+              <a:fontRef idx="minor">
+                <a:schemeClr val="tx1"/>
+              </a:fontRef>
+            </p:style>
+          </p:cxnSp>
+          <p:cxnSp>
+            <p:nvCxnSpPr>
+              <p:cNvPr id="106" name="Straight Arrow Connector 105">
+                <a:extLst>
+                  <a:ext uri="{FF2B5EF4-FFF2-40B4-BE49-F238E27FC236}">
+                    <a16:creationId xmlns:a16="http://schemas.microsoft.com/office/drawing/2014/main" id="{D916F2B1-0C32-3649-5B5B-2CD69E7BD51A}"/>
+                  </a:ext>
+                </a:extLst>
+              </p:cNvPr>
+              <p:cNvCxnSpPr>
+                <a:cxnSpLocks/>
+                <a:stCxn id="82" idx="0"/>
+                <a:endCxn id="93" idx="1"/>
+              </p:cNvCxnSpPr>
+              <p:nvPr/>
+            </p:nvCxnSpPr>
+            <p:spPr>
+              <a:xfrm flipV="1">
+                <a:off x="5808723" y="3982801"/>
+                <a:ext cx="515976" cy="5167"/>
+              </a:xfrm>
+              <a:prstGeom prst="straightConnector1">
+                <a:avLst/>
+              </a:prstGeom>
+              <a:ln w="28575">
+                <a:solidFill>
+                  <a:schemeClr val="tx1">
+                    <a:lumMod val="85000"/>
+                    <a:lumOff val="15000"/>
+                  </a:schemeClr>
+                </a:solidFill>
+                <a:tailEnd type="triangle"/>
+              </a:ln>
+            </p:spPr>
+            <p:style>
+              <a:lnRef idx="1">
+                <a:schemeClr val="accent1"/>
+              </a:lnRef>
+              <a:fillRef idx="0">
+                <a:schemeClr val="accent1"/>
+              </a:fillRef>
+              <a:effectRef idx="0">
+                <a:schemeClr val="accent1"/>
+              </a:effectRef>
+              <a:fontRef idx="minor">
+                <a:schemeClr val="tx1"/>
+              </a:fontRef>
+            </p:style>
+          </p:cxnSp>
+          <p:cxnSp>
+            <p:nvCxnSpPr>
+              <p:cNvPr id="112" name="Straight Arrow Connector 111">
+                <a:extLst>
+                  <a:ext uri="{FF2B5EF4-FFF2-40B4-BE49-F238E27FC236}">
+                    <a16:creationId xmlns:a16="http://schemas.microsoft.com/office/drawing/2014/main" id="{D488BDCD-6630-27AE-90DE-E726C492FE6B}"/>
+                  </a:ext>
+                </a:extLst>
+              </p:cNvPr>
+              <p:cNvCxnSpPr>
+                <a:cxnSpLocks/>
+                <a:stCxn id="116" idx="3"/>
+                <a:endCxn id="82" idx="2"/>
+              </p:cNvCxnSpPr>
+              <p:nvPr/>
+            </p:nvCxnSpPr>
+            <p:spPr>
+              <a:xfrm>
+                <a:off x="4644247" y="3987968"/>
+                <a:ext cx="499614" cy="0"/>
+              </a:xfrm>
+              <a:prstGeom prst="straightConnector1">
+                <a:avLst/>
+              </a:prstGeom>
+              <a:ln w="28575">
+                <a:solidFill>
+                  <a:schemeClr val="tx1">
+                    <a:lumMod val="85000"/>
+                    <a:lumOff val="15000"/>
+                  </a:schemeClr>
+                </a:solidFill>
+                <a:tailEnd type="triangle"/>
+              </a:ln>
+            </p:spPr>
+            <p:style>
+              <a:lnRef idx="1">
+                <a:schemeClr val="accent1"/>
+              </a:lnRef>
+              <a:fillRef idx="0">
+                <a:schemeClr val="accent1"/>
+              </a:fillRef>
+              <a:effectRef idx="0">
+                <a:schemeClr val="accent1"/>
+              </a:effectRef>
+              <a:fontRef idx="minor">
+                <a:schemeClr val="tx1"/>
+              </a:fontRef>
+            </p:style>
+          </p:cxnSp>
+          <p:pic>
+            <p:nvPicPr>
+              <p:cNvPr id="116" name="Picture 115" descr="A street with cars on it and buildings in the back&#10;&#10;Description automatically generated with medium confidence">
+                <a:extLst>
+                  <a:ext uri="{FF2B5EF4-FFF2-40B4-BE49-F238E27FC236}">
+                    <a16:creationId xmlns:a16="http://schemas.microsoft.com/office/drawing/2014/main" id="{1A349A5E-A5A8-AAC3-8264-DD880D4859DF}"/>
+                  </a:ext>
+                </a:extLst>
+              </p:cNvPr>
+              <p:cNvPicPr>
+                <a:picLocks noChangeAspect="1"/>
+              </p:cNvPicPr>
+              <p:nvPr/>
+            </p:nvPicPr>
+            <p:blipFill>
+              <a:blip r:embed="rId2"/>
+              <a:stretch>
+                <a:fillRect/>
+              </a:stretch>
+            </p:blipFill>
+            <p:spPr>
+              <a:xfrm>
+                <a:off x="3801100" y="3566394"/>
+                <a:ext cx="843147" cy="843147"/>
+              </a:xfrm>
+              <a:prstGeom prst="rect">
+                <a:avLst/>
+              </a:prstGeom>
+              <a:ln w="12700" cap="sq">
+                <a:solidFill>
+                  <a:srgbClr val="000000"/>
+                </a:solidFill>
+                <a:miter lim="800000"/>
+              </a:ln>
+              <a:effectLst>
+                <a:outerShdw blurRad="57150" dist="50800" dir="2700000" algn="tl" rotWithShape="0">
+                  <a:srgbClr val="000000">
+                    <a:alpha val="40000"/>
+                  </a:srgbClr>
+                </a:outerShdw>
+              </a:effectLst>
+            </p:spPr>
+          </p:pic>
+          <p:sp>
+            <p:nvSpPr>
+              <p:cNvPr id="124" name="TextBox 123">
+                <a:extLst>
+                  <a:ext uri="{FF2B5EF4-FFF2-40B4-BE49-F238E27FC236}">
+                    <a16:creationId xmlns:a16="http://schemas.microsoft.com/office/drawing/2014/main" id="{FABA79D2-546B-F130-545C-F14F9F2981C2}"/>
+                  </a:ext>
+                </a:extLst>
+              </p:cNvPr>
+              <p:cNvSpPr txBox="1"/>
+              <p:nvPr/>
+            </p:nvSpPr>
+            <p:spPr>
+              <a:xfrm>
+                <a:off x="5076421" y="5020083"/>
+                <a:ext cx="799740" cy="338554"/>
+              </a:xfrm>
+              <a:prstGeom prst="rect">
+                <a:avLst/>
+              </a:prstGeom>
+              <a:noFill/>
+            </p:spPr>
+            <p:txBody>
+              <a:bodyPr wrap="square" rtlCol="0">
+                <a:spAutoFit/>
+              </a:bodyPr>
+              <a:lstStyle/>
+              <a:p>
+                <a:pPr algn="ctr"/>
+                <a:r>
+                  <a:rPr lang="en-US" sz="1600" dirty="0"/>
+                  <a:t>Frozen</a:t>
+                </a:r>
+              </a:p>
+            </p:txBody>
+          </p:sp>
+          <p:sp>
+            <p:nvSpPr>
+              <p:cNvPr id="125" name="Right Brace 124">
+                <a:extLst>
+                  <a:ext uri="{FF2B5EF4-FFF2-40B4-BE49-F238E27FC236}">
+                    <a16:creationId xmlns:a16="http://schemas.microsoft.com/office/drawing/2014/main" id="{6E4EA7AD-5201-86A6-8C3F-0D8D88D89C38}"/>
+                  </a:ext>
+                </a:extLst>
+              </p:cNvPr>
+              <p:cNvSpPr/>
+              <p:nvPr/>
+            </p:nvSpPr>
+            <p:spPr>
+              <a:xfrm rot="5400000">
+                <a:off x="7095214" y="3938131"/>
+                <a:ext cx="240627" cy="1814387"/>
+              </a:xfrm>
+              <a:prstGeom prst="rightBrace">
+                <a:avLst/>
+              </a:prstGeom>
+              <a:ln w="28575">
+                <a:solidFill>
+                  <a:schemeClr val="tx1"/>
+                </a:solidFill>
+              </a:ln>
+            </p:spPr>
+            <p:style>
+              <a:lnRef idx="1">
+                <a:schemeClr val="accent1"/>
+              </a:lnRef>
+              <a:fillRef idx="0">
+                <a:schemeClr val="accent1"/>
+              </a:fillRef>
+              <a:effectRef idx="0">
+                <a:schemeClr val="accent1"/>
+              </a:effectRef>
+              <a:fontRef idx="minor">
+                <a:schemeClr val="tx1"/>
+              </a:fontRef>
+            </p:style>
+            <p:txBody>
+              <a:bodyPr rtlCol="0" anchor="ctr"/>
+              <a:lstStyle/>
+              <a:p>
+                <a:pPr algn="ctr"/>
+                <a:endParaRPr lang="en-US"/>
+              </a:p>
+            </p:txBody>
+          </p:sp>
+          <p:sp>
+            <p:nvSpPr>
+              <p:cNvPr id="127" name="TextBox 126">
+                <a:extLst>
+                  <a:ext uri="{FF2B5EF4-FFF2-40B4-BE49-F238E27FC236}">
+                    <a16:creationId xmlns:a16="http://schemas.microsoft.com/office/drawing/2014/main" id="{90A40ED3-8764-C1A8-478D-3717F95DF2B1}"/>
+                  </a:ext>
+                </a:extLst>
+              </p:cNvPr>
+              <p:cNvSpPr txBox="1"/>
+              <p:nvPr/>
+            </p:nvSpPr>
+            <p:spPr>
+              <a:xfrm>
+                <a:off x="6268080" y="5020083"/>
+                <a:ext cx="1894894" cy="338554"/>
+              </a:xfrm>
+              <a:prstGeom prst="rect">
+                <a:avLst/>
+              </a:prstGeom>
+              <a:noFill/>
+            </p:spPr>
+            <p:txBody>
+              <a:bodyPr wrap="square" rtlCol="0">
+                <a:spAutoFit/>
+              </a:bodyPr>
+              <a:lstStyle/>
+              <a:p>
+                <a:pPr algn="ctr"/>
+                <a:r>
+                  <a:rPr lang="en-US" sz="1600" dirty="0"/>
+                  <a:t>A simple network</a:t>
+                </a:r>
+              </a:p>
+            </p:txBody>
+          </p:sp>
+        </p:grpSp>
+        <p:pic>
+          <p:nvPicPr>
+            <p:cNvPr id="131" name="Graphic 130" descr="Line arrow: Clockwise curve with solid fill">
+              <a:extLst>
+                <a:ext uri="{FF2B5EF4-FFF2-40B4-BE49-F238E27FC236}">
+                  <a16:creationId xmlns:a16="http://schemas.microsoft.com/office/drawing/2014/main" id="{C93A055B-34CA-371E-0469-9A527084697E}"/>
+                </a:ext>
+              </a:extLst>
+            </p:cNvPr>
+            <p:cNvPicPr>
+              <a:picLocks noChangeAspect="1"/>
+            </p:cNvPicPr>
+            <p:nvPr/>
+          </p:nvPicPr>
+          <p:blipFill>
+            <a:blip r:embed="rId4">
+              <a:extLst>
+                <a:ext uri="{96DAC541-7B7A-43D3-8B79-37D633B846F1}">
+                  <asvg:svgBlip xmlns:asvg="http://schemas.microsoft.com/office/drawing/2016/SVG/main" r:embed="rId5"/>
+                </a:ext>
+              </a:extLst>
+            </a:blip>
+            <a:stretch>
+              <a:fillRect/>
+            </a:stretch>
+          </p:blipFill>
+          <p:spPr>
+            <a:xfrm rot="12852321">
+              <a:off x="5071989" y="2622545"/>
+              <a:ext cx="914400" cy="914400"/>
+            </a:xfrm>
+            <a:prstGeom prst="rect">
+              <a:avLst/>
+            </a:prstGeom>
+          </p:spPr>
+        </p:pic>
+        <p:sp>
+          <p:nvSpPr>
+            <p:cNvPr id="132" name="TextBox 131">
+              <a:extLst>
+                <a:ext uri="{FF2B5EF4-FFF2-40B4-BE49-F238E27FC236}">
+                  <a16:creationId xmlns:a16="http://schemas.microsoft.com/office/drawing/2014/main" id="{65CC9823-730F-DB29-1807-289758800B0E}"/>
+                </a:ext>
+              </a:extLst>
+            </p:cNvPr>
+            <p:cNvSpPr txBox="1"/>
+            <p:nvPr/>
+          </p:nvSpPr>
+          <p:spPr>
+            <a:xfrm>
+              <a:off x="1446455" y="4715873"/>
+              <a:ext cx="1668534" cy="400110"/>
+            </a:xfrm>
+            <a:prstGeom prst="rect">
+              <a:avLst/>
+            </a:prstGeom>
+            <a:noFill/>
+          </p:spPr>
+          <p:txBody>
+            <a:bodyPr wrap="none" rtlCol="0">
+              <a:spAutoFit/>
+            </a:bodyPr>
+            <a:lstStyle/>
+            <a:p>
+              <a:r>
+                <a:rPr lang="en-US" sz="2000" b="1" dirty="0"/>
+                <a:t>LTS Prediction</a:t>
+              </a:r>
+            </a:p>
+          </p:txBody>
+        </p:sp>
+        <p:sp>
+          <p:nvSpPr>
+            <p:cNvPr id="133" name="TextBox 132">
+              <a:extLst>
+                <a:ext uri="{FF2B5EF4-FFF2-40B4-BE49-F238E27FC236}">
+                  <a16:creationId xmlns:a16="http://schemas.microsoft.com/office/drawing/2014/main" id="{5689DD33-2013-B485-091F-4CAF0F972394}"/>
+                </a:ext>
+              </a:extLst>
+            </p:cNvPr>
+            <p:cNvSpPr txBox="1"/>
+            <p:nvPr/>
+          </p:nvSpPr>
+          <p:spPr>
+            <a:xfrm>
+              <a:off x="1446455" y="1296269"/>
+              <a:ext cx="1685911" cy="400110"/>
+            </a:xfrm>
+            <a:prstGeom prst="rect">
+              <a:avLst/>
+            </a:prstGeom>
+            <a:noFill/>
+          </p:spPr>
+          <p:txBody>
+            <a:bodyPr wrap="none" rtlCol="0">
+              <a:spAutoFit/>
+            </a:bodyPr>
+            <a:lstStyle/>
+            <a:p>
+              <a:r>
+                <a:rPr lang="en-US" sz="2000" b="1" dirty="0"/>
+                <a:t>A Pretext Task</a:t>
+              </a:r>
+            </a:p>
+          </p:txBody>
+        </p:sp>
+      </p:grpSp>
     </p:spTree>
     <p:extLst>
       <p:ext uri="{BB962C8B-B14F-4D97-AF65-F5344CB8AC3E}">

</xml_diff>